<commit_message>
added diag 'integrated document'
</commit_message>
<xml_diff>
--- a/Isabelle_DOF/document/figures/document-model.pptx
+++ b/Isabelle_DOF/document/figures/document-model.pptx
@@ -13,6 +13,7 @@
     <p:sldId id="258" r:id="rId10"/>
     <p:sldId id="259" r:id="rId11"/>
     <p:sldId id="260" r:id="rId12"/>
+    <p:sldId id="261" r:id="rId13"/>
   </p:sldIdLst>
   <p:sldSz cx="13004800" cy="9753600"/>
   <p:notesSz cx="6858000" cy="9144000"/>
@@ -2929,24 +2930,138 @@
       </p:grpSpPr>
       <p:sp>
         <p:nvSpPr>
-          <p:cNvPr id="119" name="Rectangle"/>
-          <p:cNvSpPr/>
-          <p:nvPr/>
-        </p:nvSpPr>
-        <p:spPr>
-          <a:xfrm>
-            <a:off x="5969000" y="104921"/>
-            <a:ext cx="2499817" cy="3017159"/>
+          <p:cNvPr id="119" name="Document-centric model-based engineering with Isabelle"/>
+          <p:cNvSpPr txBox="1"/>
+          <p:nvPr/>
+        </p:nvSpPr>
+        <p:spPr>
+          <a:xfrm>
+            <a:off x="1015288" y="1109320"/>
+            <a:ext cx="6445693" cy="829360"/>
           </a:xfrm>
           <a:prstGeom prst="rect">
             <a:avLst/>
           </a:prstGeom>
+          <a:ln w="12700">
+            <a:miter lim="400000"/>
+          </a:ln>
+          <a:extLst>
+            <a:ext uri="{C572A759-6A51-4108-AA02-DFA0A04FC94B}">
+              <ma14:wrappingTextBoxFlag xmlns:ma14="http://schemas.microsoft.com/office/mac/drawingml/2011/main" val="1"/>
+            </a:ext>
+          </a:extLst>
+        </p:spPr>
+        <p:txBody>
+          <a:bodyPr lIns="50800" tIns="50800" rIns="50800" bIns="50800" anchor="ctr">
+            <a:spAutoFit/>
+          </a:bodyPr>
+          <a:lstStyle/>
+          <a:p>
+            <a:pPr/>
+            <a:r>
+              <a:t>Document-centric model-based engineering with Isabelle</a:t>
+            </a:r>
+          </a:p>
+        </p:txBody>
+      </p:sp>
+      <p:sp>
+        <p:nvSpPr>
+          <p:cNvPr id="120" name="Cylinder"/>
+          <p:cNvSpPr/>
+          <p:nvPr/>
+        </p:nvSpPr>
+        <p:spPr>
+          <a:xfrm>
+            <a:off x="4784145" y="3138982"/>
+            <a:ext cx="3995810" cy="5275016"/>
+          </a:xfrm>
+          <a:custGeom>
+            <a:avLst/>
+            <a:gdLst/>
+            <a:ahLst/>
+            <a:cxnLst>
+              <a:cxn ang="0">
+                <a:pos x="wd2" y="hd2"/>
+              </a:cxn>
+              <a:cxn ang="5400000">
+                <a:pos x="wd2" y="hd2"/>
+              </a:cxn>
+              <a:cxn ang="10800000">
+                <a:pos x="wd2" y="hd2"/>
+              </a:cxn>
+              <a:cxn ang="16200000">
+                <a:pos x="wd2" y="hd2"/>
+              </a:cxn>
+            </a:cxnLst>
+            <a:rect l="0" t="0" r="r" b="b"/>
+            <a:pathLst>
+              <a:path w="19679" h="21600" fill="norm" stroke="1" extrusionOk="0">
+                <a:moveTo>
+                  <a:pt x="9839" y="0"/>
+                </a:moveTo>
+                <a:cubicBezTo>
+                  <a:pt x="7321" y="0"/>
+                  <a:pt x="4803" y="241"/>
+                  <a:pt x="2882" y="724"/>
+                </a:cubicBezTo>
+                <a:cubicBezTo>
+                  <a:pt x="-961" y="1689"/>
+                  <a:pt x="-961" y="3255"/>
+                  <a:pt x="2882" y="4221"/>
+                </a:cubicBezTo>
+                <a:cubicBezTo>
+                  <a:pt x="6724" y="5186"/>
+                  <a:pt x="12954" y="5186"/>
+                  <a:pt x="16796" y="4221"/>
+                </a:cubicBezTo>
+                <a:cubicBezTo>
+                  <a:pt x="20639" y="3255"/>
+                  <a:pt x="20639" y="1689"/>
+                  <a:pt x="16796" y="724"/>
+                </a:cubicBezTo>
+                <a:cubicBezTo>
+                  <a:pt x="14875" y="241"/>
+                  <a:pt x="12357" y="0"/>
+                  <a:pt x="9839" y="0"/>
+                </a:cubicBezTo>
+                <a:close/>
+                <a:moveTo>
+                  <a:pt x="0" y="3593"/>
+                </a:moveTo>
+                <a:lnTo>
+                  <a:pt x="0" y="18993"/>
+                </a:lnTo>
+                <a:cubicBezTo>
+                  <a:pt x="0" y="20356"/>
+                  <a:pt x="4405" y="21600"/>
+                  <a:pt x="9839" y="21600"/>
+                </a:cubicBezTo>
+                <a:cubicBezTo>
+                  <a:pt x="15273" y="21600"/>
+                  <a:pt x="19678" y="20356"/>
+                  <a:pt x="19678" y="18993"/>
+                </a:cubicBezTo>
+                <a:lnTo>
+                  <a:pt x="19678" y="3593"/>
+                </a:lnTo>
+                <a:cubicBezTo>
+                  <a:pt x="18279" y="4621"/>
+                  <a:pt x="14401" y="5357"/>
+                  <a:pt x="9839" y="5357"/>
+                </a:cubicBezTo>
+                <a:cubicBezTo>
+                  <a:pt x="5277" y="5357"/>
+                  <a:pt x="1399" y="4621"/>
+                  <a:pt x="0" y="3593"/>
+                </a:cubicBezTo>
+                <a:close/>
+              </a:path>
+            </a:pathLst>
+          </a:custGeom>
           <a:solidFill>
-            <a:srgbClr val="D7D500">
-              <a:alpha val="58350"/>
-            </a:srgbClr>
+            <a:schemeClr val="accent1"/>
           </a:solidFill>
-          <a:ln w="63500">
+          <a:ln w="25400">
             <a:solidFill>
               <a:srgbClr val="000000"/>
             </a:solidFill>
@@ -2971,16 +3086,1917 @@
           </a:p>
         </p:txBody>
       </p:sp>
-      <p:sp>
-        <p:nvSpPr>
-          <p:cNvPr id="120" name="A"/>
+      <p:grpSp>
+        <p:nvGrpSpPr>
+          <p:cNvPr id="155" name="Group"/>
+          <p:cNvGrpSpPr/>
+          <p:nvPr/>
+        </p:nvGrpSpPr>
+        <p:grpSpPr>
+          <a:xfrm>
+            <a:off x="5436757" y="4843270"/>
+            <a:ext cx="2894381" cy="3086407"/>
+            <a:chOff x="0" y="0"/>
+            <a:chExt cx="2894380" cy="3086406"/>
+          </a:xfrm>
+        </p:grpSpPr>
+        <p:sp>
+          <p:nvSpPr>
+            <p:cNvPr id="121" name="Rectangle"/>
+            <p:cNvSpPr/>
+            <p:nvPr/>
+          </p:nvSpPr>
+          <p:spPr>
+            <a:xfrm>
+              <a:off x="1061901" y="0"/>
+              <a:ext cx="821943" cy="992045"/>
+            </a:xfrm>
+            <a:prstGeom prst="rect">
+              <a:avLst/>
+            </a:prstGeom>
+            <a:solidFill>
+              <a:srgbClr val="D7D500">
+                <a:alpha val="58350"/>
+              </a:srgbClr>
+            </a:solidFill>
+            <a:ln w="63500" cap="flat">
+              <a:solidFill>
+                <a:srgbClr val="000000"/>
+              </a:solidFill>
+              <a:prstDash val="solid"/>
+              <a:miter lim="400000"/>
+            </a:ln>
+            <a:effectLst/>
+          </p:spPr>
+          <p:txBody>
+            <a:bodyPr wrap="square" lIns="50800" tIns="50800" rIns="50800" bIns="50800" numCol="1" anchor="ctr">
+              <a:noAutofit/>
+            </a:bodyPr>
+            <a:lstStyle/>
+            <a:p>
+              <a:pPr>
+                <a:defRPr b="0" sz="2200">
+                  <a:solidFill>
+                    <a:srgbClr val="FFFFFF"/>
+                  </a:solidFill>
+                  <a:latin typeface="+mn-lt"/>
+                  <a:ea typeface="+mn-ea"/>
+                  <a:cs typeface="+mn-cs"/>
+                  <a:sym typeface="Helvetica Neue Medium"/>
+                </a:defRPr>
+              </a:pPr>
+            </a:p>
+          </p:txBody>
+        </p:sp>
+        <p:sp>
+          <p:nvSpPr>
+            <p:cNvPr id="122" name="A"/>
+            <p:cNvSpPr txBox="1"/>
+            <p:nvPr/>
+          </p:nvSpPr>
+          <p:spPr>
+            <a:xfrm>
+              <a:off x="1096477" y="73437"/>
+              <a:ext cx="106232" cy="151597"/>
+            </a:xfrm>
+            <a:prstGeom prst="rect">
+              <a:avLst/>
+            </a:prstGeom>
+            <a:noFill/>
+            <a:ln w="12700" cap="flat">
+              <a:noFill/>
+              <a:miter lim="400000"/>
+            </a:ln>
+            <a:effectLst/>
+            <a:extLst>
+              <a:ext uri="{C572A759-6A51-4108-AA02-DFA0A04FC94B}">
+                <ma14:wrappingTextBoxFlag xmlns:ma14="http://schemas.microsoft.com/office/mac/drawingml/2011/main" val="1"/>
+              </a:ext>
+            </a:extLst>
+          </p:spPr>
+          <p:txBody>
+            <a:bodyPr wrap="square" lIns="50800" tIns="50800" rIns="50800" bIns="50800" numCol="1" anchor="ctr">
+              <a:noAutofit/>
+            </a:bodyPr>
+            <a:lstStyle/>
+            <a:p>
+              <a:pPr/>
+              <a:r>
+                <a:t>A</a:t>
+              </a:r>
+            </a:p>
+          </p:txBody>
+        </p:sp>
+        <p:sp>
+          <p:nvSpPr>
+            <p:cNvPr id="123" name="header"/>
+            <p:cNvSpPr/>
+            <p:nvPr/>
+          </p:nvSpPr>
+          <p:spPr>
+            <a:xfrm>
+              <a:off x="1241460" y="81788"/>
+              <a:ext cx="609810" cy="151598"/>
+            </a:xfrm>
+            <a:prstGeom prst="roundRect">
+              <a:avLst>
+                <a:gd name="adj" fmla="val 19497"/>
+              </a:avLst>
+            </a:prstGeom>
+            <a:solidFill>
+              <a:schemeClr val="accent1"/>
+            </a:solidFill>
+            <a:ln w="12700" cap="flat">
+              <a:noFill/>
+              <a:miter lim="400000"/>
+            </a:ln>
+            <a:effectLst/>
+            <a:extLst>
+              <a:ext uri="{C572A759-6A51-4108-AA02-DFA0A04FC94B}">
+                <ma14:wrappingTextBoxFlag xmlns:ma14="http://schemas.microsoft.com/office/mac/drawingml/2011/main" val="1"/>
+              </a:ext>
+            </a:extLst>
+          </p:spPr>
+          <p:txBody>
+            <a:bodyPr wrap="square" lIns="50800" tIns="50800" rIns="50800" bIns="50800" numCol="1" anchor="ctr">
+              <a:noAutofit/>
+            </a:bodyPr>
+            <a:lstStyle>
+              <a:lvl1pPr>
+                <a:defRPr b="0" sz="1800">
+                  <a:solidFill>
+                    <a:srgbClr val="FFFFFF"/>
+                  </a:solidFill>
+                  <a:latin typeface="+mn-lt"/>
+                  <a:ea typeface="+mn-ea"/>
+                  <a:cs typeface="+mn-cs"/>
+                  <a:sym typeface="Helvetica Neue Medium"/>
+                </a:defRPr>
+              </a:lvl1pPr>
+            </a:lstStyle>
+            <a:p>
+              <a:pPr/>
+              <a:r>
+                <a:t>header</a:t>
+              </a:r>
+            </a:p>
+          </p:txBody>
+        </p:sp>
+        <p:sp>
+          <p:nvSpPr>
+            <p:cNvPr id="124" name="context…"/>
+            <p:cNvSpPr/>
+            <p:nvPr/>
+          </p:nvSpPr>
+          <p:spPr>
+            <a:xfrm>
+              <a:off x="1241460" y="248992"/>
+              <a:ext cx="609810" cy="229192"/>
+            </a:xfrm>
+            <a:prstGeom prst="roundRect">
+              <a:avLst>
+                <a:gd name="adj" fmla="val 12896"/>
+              </a:avLst>
+            </a:prstGeom>
+            <a:solidFill>
+              <a:schemeClr val="accent1"/>
+            </a:solidFill>
+            <a:ln w="12700" cap="flat">
+              <a:noFill/>
+              <a:miter lim="400000"/>
+            </a:ln>
+            <a:effectLst/>
+            <a:extLst>
+              <a:ext uri="{C572A759-6A51-4108-AA02-DFA0A04FC94B}">
+                <ma14:wrappingTextBoxFlag xmlns:ma14="http://schemas.microsoft.com/office/mac/drawingml/2011/main" val="1"/>
+              </a:ext>
+            </a:extLst>
+          </p:spPr>
+          <p:txBody>
+            <a:bodyPr wrap="square" lIns="50800" tIns="50800" rIns="50800" bIns="50800" numCol="1" anchor="ctr">
+              <a:noAutofit/>
+            </a:bodyPr>
+            <a:lstStyle/>
+            <a:p>
+              <a:pPr>
+                <a:defRPr b="0" sz="1800">
+                  <a:solidFill>
+                    <a:srgbClr val="FFFFFF"/>
+                  </a:solidFill>
+                  <a:latin typeface="+mn-lt"/>
+                  <a:ea typeface="+mn-ea"/>
+                  <a:cs typeface="+mn-cs"/>
+                  <a:sym typeface="Helvetica Neue Medium"/>
+                </a:defRPr>
+              </a:pPr>
+              <a:r>
+                <a:t>context</a:t>
+              </a:r>
+            </a:p>
+            <a:p>
+              <a:pPr>
+                <a:defRPr b="0" sz="1800">
+                  <a:solidFill>
+                    <a:srgbClr val="FFFFFF"/>
+                  </a:solidFill>
+                  <a:latin typeface="+mn-lt"/>
+                  <a:ea typeface="+mn-ea"/>
+                  <a:cs typeface="+mn-cs"/>
+                  <a:sym typeface="Helvetica Neue Medium"/>
+                </a:defRPr>
+              </a:pPr>
+              <a:r>
+                <a:t>definition</a:t>
+              </a:r>
+            </a:p>
+          </p:txBody>
+        </p:sp>
+        <p:sp>
+          <p:nvSpPr>
+            <p:cNvPr id="125" name="command"/>
+            <p:cNvSpPr/>
+            <p:nvPr/>
+          </p:nvSpPr>
+          <p:spPr>
+            <a:xfrm>
+              <a:off x="1241460" y="499276"/>
+              <a:ext cx="609810" cy="108274"/>
+            </a:xfrm>
+            <a:prstGeom prst="roundRect">
+              <a:avLst>
+                <a:gd name="adj" fmla="val 27298"/>
+              </a:avLst>
+            </a:prstGeom>
+            <a:solidFill>
+              <a:srgbClr val="FF5126"/>
+            </a:solidFill>
+            <a:ln w="12700" cap="flat">
+              <a:noFill/>
+              <a:miter lim="400000"/>
+            </a:ln>
+            <a:effectLst/>
+            <a:extLst>
+              <a:ext uri="{C572A759-6A51-4108-AA02-DFA0A04FC94B}">
+                <ma14:wrappingTextBoxFlag xmlns:ma14="http://schemas.microsoft.com/office/mac/drawingml/2011/main" val="1"/>
+              </a:ext>
+            </a:extLst>
+          </p:spPr>
+          <p:txBody>
+            <a:bodyPr wrap="square" lIns="50800" tIns="50800" rIns="50800" bIns="50800" numCol="1" anchor="ctr">
+              <a:noAutofit/>
+            </a:bodyPr>
+            <a:lstStyle>
+              <a:lvl1pPr>
+                <a:defRPr b="0" sz="1400">
+                  <a:solidFill>
+                    <a:srgbClr val="FFFFFF"/>
+                  </a:solidFill>
+                  <a:latin typeface="+mn-lt"/>
+                  <a:ea typeface="+mn-ea"/>
+                  <a:cs typeface="+mn-cs"/>
+                  <a:sym typeface="Helvetica Neue Medium"/>
+                </a:defRPr>
+              </a:lvl1pPr>
+            </a:lstStyle>
+            <a:p>
+              <a:pPr/>
+              <a:r>
+                <a:t>command</a:t>
+              </a:r>
+            </a:p>
+          </p:txBody>
+        </p:sp>
+        <p:sp>
+          <p:nvSpPr>
+            <p:cNvPr id="126" name="command"/>
+            <p:cNvSpPr/>
+            <p:nvPr/>
+          </p:nvSpPr>
+          <p:spPr>
+            <a:xfrm>
+              <a:off x="1241460" y="616197"/>
+              <a:ext cx="609810" cy="108274"/>
+            </a:xfrm>
+            <a:prstGeom prst="roundRect">
+              <a:avLst>
+                <a:gd name="adj" fmla="val 27298"/>
+              </a:avLst>
+            </a:prstGeom>
+            <a:solidFill>
+              <a:srgbClr val="FF5126"/>
+            </a:solidFill>
+            <a:ln w="12700" cap="flat">
+              <a:noFill/>
+              <a:miter lim="400000"/>
+            </a:ln>
+            <a:effectLst/>
+            <a:extLst>
+              <a:ext uri="{C572A759-6A51-4108-AA02-DFA0A04FC94B}">
+                <ma14:wrappingTextBoxFlag xmlns:ma14="http://schemas.microsoft.com/office/mac/drawingml/2011/main" val="1"/>
+              </a:ext>
+            </a:extLst>
+          </p:spPr>
+          <p:txBody>
+            <a:bodyPr wrap="square" lIns="50800" tIns="50800" rIns="50800" bIns="50800" numCol="1" anchor="ctr">
+              <a:noAutofit/>
+            </a:bodyPr>
+            <a:lstStyle>
+              <a:lvl1pPr>
+                <a:defRPr b="0" sz="1400">
+                  <a:solidFill>
+                    <a:srgbClr val="FFFFFF"/>
+                  </a:solidFill>
+                  <a:latin typeface="+mn-lt"/>
+                  <a:ea typeface="+mn-ea"/>
+                  <a:cs typeface="+mn-cs"/>
+                  <a:sym typeface="Helvetica Neue Medium"/>
+                </a:defRPr>
+              </a:lvl1pPr>
+            </a:lstStyle>
+            <a:p>
+              <a:pPr/>
+              <a:r>
+                <a:t>command</a:t>
+              </a:r>
+            </a:p>
+          </p:txBody>
+        </p:sp>
+        <p:sp>
+          <p:nvSpPr>
+            <p:cNvPr id="127" name="command"/>
+            <p:cNvSpPr/>
+            <p:nvPr/>
+          </p:nvSpPr>
+          <p:spPr>
+            <a:xfrm>
+              <a:off x="1232935" y="734055"/>
+              <a:ext cx="609811" cy="108274"/>
+            </a:xfrm>
+            <a:prstGeom prst="roundRect">
+              <a:avLst>
+                <a:gd name="adj" fmla="val 27298"/>
+              </a:avLst>
+            </a:prstGeom>
+            <a:solidFill>
+              <a:srgbClr val="FF5126"/>
+            </a:solidFill>
+            <a:ln w="12700" cap="flat">
+              <a:noFill/>
+              <a:miter lim="400000"/>
+            </a:ln>
+            <a:effectLst/>
+            <a:extLst>
+              <a:ext uri="{C572A759-6A51-4108-AA02-DFA0A04FC94B}">
+                <ma14:wrappingTextBoxFlag xmlns:ma14="http://schemas.microsoft.com/office/mac/drawingml/2011/main" val="1"/>
+              </a:ext>
+            </a:extLst>
+          </p:spPr>
+          <p:txBody>
+            <a:bodyPr wrap="square" lIns="50800" tIns="50800" rIns="50800" bIns="50800" numCol="1" anchor="ctr">
+              <a:noAutofit/>
+            </a:bodyPr>
+            <a:lstStyle>
+              <a:lvl1pPr>
+                <a:defRPr b="0" sz="1400">
+                  <a:solidFill>
+                    <a:srgbClr val="FFFFFF"/>
+                  </a:solidFill>
+                  <a:latin typeface="+mn-lt"/>
+                  <a:ea typeface="+mn-ea"/>
+                  <a:cs typeface="+mn-cs"/>
+                  <a:sym typeface="Helvetica Neue Medium"/>
+                </a:defRPr>
+              </a:lvl1pPr>
+            </a:lstStyle>
+            <a:p>
+              <a:pPr/>
+              <a:r>
+                <a:t>command</a:t>
+              </a:r>
+            </a:p>
+          </p:txBody>
+        </p:sp>
+        <p:sp>
+          <p:nvSpPr>
+            <p:cNvPr id="128" name="command"/>
+            <p:cNvSpPr/>
+            <p:nvPr/>
+          </p:nvSpPr>
+          <p:spPr>
+            <a:xfrm>
+              <a:off x="1232935" y="855152"/>
+              <a:ext cx="609811" cy="108274"/>
+            </a:xfrm>
+            <a:prstGeom prst="roundRect">
+              <a:avLst>
+                <a:gd name="adj" fmla="val 27298"/>
+              </a:avLst>
+            </a:prstGeom>
+            <a:solidFill>
+              <a:srgbClr val="FF5126"/>
+            </a:solidFill>
+            <a:ln w="12700" cap="flat">
+              <a:noFill/>
+              <a:miter lim="400000"/>
+            </a:ln>
+            <a:effectLst/>
+            <a:extLst>
+              <a:ext uri="{C572A759-6A51-4108-AA02-DFA0A04FC94B}">
+                <ma14:wrappingTextBoxFlag xmlns:ma14="http://schemas.microsoft.com/office/mac/drawingml/2011/main" val="1"/>
+              </a:ext>
+            </a:extLst>
+          </p:spPr>
+          <p:txBody>
+            <a:bodyPr wrap="square" lIns="50800" tIns="50800" rIns="50800" bIns="50800" numCol="1" anchor="ctr">
+              <a:noAutofit/>
+            </a:bodyPr>
+            <a:lstStyle>
+              <a:lvl1pPr>
+                <a:defRPr b="0" sz="1400">
+                  <a:solidFill>
+                    <a:srgbClr val="FFFFFF"/>
+                  </a:solidFill>
+                  <a:latin typeface="+mn-lt"/>
+                  <a:ea typeface="+mn-ea"/>
+                  <a:cs typeface="+mn-cs"/>
+                  <a:sym typeface="Helvetica Neue Medium"/>
+                </a:defRPr>
+              </a:lvl1pPr>
+            </a:lstStyle>
+            <a:p>
+              <a:pPr/>
+              <a:r>
+                <a:t>command</a:t>
+              </a:r>
+            </a:p>
+          </p:txBody>
+        </p:sp>
+        <p:sp>
+          <p:nvSpPr>
+            <p:cNvPr id="129" name="Rectangle"/>
+            <p:cNvSpPr/>
+            <p:nvPr/>
+          </p:nvSpPr>
+          <p:spPr>
+            <a:xfrm>
+              <a:off x="0" y="1251418"/>
+              <a:ext cx="821942" cy="950952"/>
+            </a:xfrm>
+            <a:prstGeom prst="rect">
+              <a:avLst/>
+            </a:prstGeom>
+            <a:solidFill>
+              <a:srgbClr val="D7D500">
+                <a:alpha val="58350"/>
+              </a:srgbClr>
+            </a:solidFill>
+            <a:ln w="63500" cap="flat">
+              <a:solidFill>
+                <a:srgbClr val="000000"/>
+              </a:solidFill>
+              <a:prstDash val="solid"/>
+              <a:miter lim="400000"/>
+            </a:ln>
+            <a:effectLst/>
+          </p:spPr>
+          <p:txBody>
+            <a:bodyPr wrap="square" lIns="50800" tIns="50800" rIns="50800" bIns="50800" numCol="1" anchor="ctr">
+              <a:noAutofit/>
+            </a:bodyPr>
+            <a:lstStyle/>
+            <a:p>
+              <a:pPr>
+                <a:defRPr b="0" sz="2200">
+                  <a:solidFill>
+                    <a:srgbClr val="FFFFFF"/>
+                  </a:solidFill>
+                  <a:latin typeface="+mn-lt"/>
+                  <a:ea typeface="+mn-ea"/>
+                  <a:cs typeface="+mn-cs"/>
+                  <a:sym typeface="Helvetica Neue Medium"/>
+                </a:defRPr>
+              </a:pPr>
+            </a:p>
+          </p:txBody>
+        </p:sp>
+        <p:sp>
+          <p:nvSpPr>
+            <p:cNvPr id="130" name="B"/>
+            <p:cNvSpPr txBox="1"/>
+            <p:nvPr/>
+          </p:nvSpPr>
+          <p:spPr>
+            <a:xfrm>
+              <a:off x="9824" y="1234301"/>
+              <a:ext cx="108137" cy="151598"/>
+            </a:xfrm>
+            <a:prstGeom prst="rect">
+              <a:avLst/>
+            </a:prstGeom>
+            <a:noFill/>
+            <a:ln w="12700" cap="flat">
+              <a:noFill/>
+              <a:miter lim="400000"/>
+            </a:ln>
+            <a:effectLst/>
+            <a:extLst>
+              <a:ext uri="{C572A759-6A51-4108-AA02-DFA0A04FC94B}">
+                <ma14:wrappingTextBoxFlag xmlns:ma14="http://schemas.microsoft.com/office/mac/drawingml/2011/main" val="1"/>
+              </a:ext>
+            </a:extLst>
+          </p:spPr>
+          <p:txBody>
+            <a:bodyPr wrap="square" lIns="50800" tIns="50800" rIns="50800" bIns="50800" numCol="1" anchor="ctr">
+              <a:noAutofit/>
+            </a:bodyPr>
+            <a:lstStyle/>
+            <a:p>
+              <a:pPr/>
+              <a:r>
+                <a:t>B</a:t>
+              </a:r>
+            </a:p>
+          </p:txBody>
+        </p:sp>
+        <p:sp>
+          <p:nvSpPr>
+            <p:cNvPr id="131" name="header"/>
+            <p:cNvSpPr/>
+            <p:nvPr/>
+          </p:nvSpPr>
+          <p:spPr>
+            <a:xfrm>
+              <a:off x="151583" y="1303723"/>
+              <a:ext cx="609811" cy="151598"/>
+            </a:xfrm>
+            <a:prstGeom prst="roundRect">
+              <a:avLst>
+                <a:gd name="adj" fmla="val 19497"/>
+              </a:avLst>
+            </a:prstGeom>
+            <a:solidFill>
+              <a:schemeClr val="accent1"/>
+            </a:solidFill>
+            <a:ln w="12700" cap="flat">
+              <a:noFill/>
+              <a:miter lim="400000"/>
+            </a:ln>
+            <a:effectLst/>
+            <a:extLst>
+              <a:ext uri="{C572A759-6A51-4108-AA02-DFA0A04FC94B}">
+                <ma14:wrappingTextBoxFlag xmlns:ma14="http://schemas.microsoft.com/office/mac/drawingml/2011/main" val="1"/>
+              </a:ext>
+            </a:extLst>
+          </p:spPr>
+          <p:txBody>
+            <a:bodyPr wrap="square" lIns="50800" tIns="50800" rIns="50800" bIns="50800" numCol="1" anchor="ctr">
+              <a:noAutofit/>
+            </a:bodyPr>
+            <a:lstStyle>
+              <a:lvl1pPr>
+                <a:defRPr b="0" sz="1800">
+                  <a:solidFill>
+                    <a:srgbClr val="FFFFFF"/>
+                  </a:solidFill>
+                  <a:latin typeface="+mn-lt"/>
+                  <a:ea typeface="+mn-ea"/>
+                  <a:cs typeface="+mn-cs"/>
+                  <a:sym typeface="Helvetica Neue Medium"/>
+                </a:defRPr>
+              </a:lvl1pPr>
+            </a:lstStyle>
+            <a:p>
+              <a:pPr/>
+              <a:r>
+                <a:t>header</a:t>
+              </a:r>
+            </a:p>
+          </p:txBody>
+        </p:sp>
+        <p:sp>
+          <p:nvSpPr>
+            <p:cNvPr id="132" name="context definition"/>
+            <p:cNvSpPr/>
+            <p:nvPr/>
+          </p:nvSpPr>
+          <p:spPr>
+            <a:xfrm>
+              <a:off x="151583" y="1471278"/>
+              <a:ext cx="609811" cy="229191"/>
+            </a:xfrm>
+            <a:custGeom>
+              <a:avLst/>
+              <a:gdLst/>
+              <a:ahLst/>
+              <a:cxnLst>
+                <a:cxn ang="0">
+                  <a:pos x="wd2" y="hd2"/>
+                </a:cxn>
+                <a:cxn ang="5400000">
+                  <a:pos x="wd2" y="hd2"/>
+                </a:cxn>
+                <a:cxn ang="10800000">
+                  <a:pos x="wd2" y="hd2"/>
+                </a:cxn>
+                <a:cxn ang="16200000">
+                  <a:pos x="wd2" y="hd2"/>
+                </a:cxn>
+              </a:cxnLst>
+              <a:rect l="0" t="0" r="r" b="b"/>
+              <a:pathLst>
+                <a:path w="21600" h="21600" fill="norm" stroke="1" extrusionOk="0">
+                  <a:moveTo>
+                    <a:pt x="1600" y="0"/>
+                  </a:moveTo>
+                  <a:lnTo>
+                    <a:pt x="20000" y="0"/>
+                  </a:lnTo>
+                  <a:cubicBezTo>
+                    <a:pt x="20229" y="0"/>
+                    <a:pt x="20402" y="0"/>
+                    <a:pt x="20549" y="26"/>
+                  </a:cubicBezTo>
+                  <a:cubicBezTo>
+                    <a:pt x="20695" y="52"/>
+                    <a:pt x="20815" y="104"/>
+                    <a:pt x="20939" y="209"/>
+                  </a:cubicBezTo>
+                  <a:cubicBezTo>
+                    <a:pt x="21074" y="340"/>
+                    <a:pt x="21195" y="547"/>
+                    <a:pt x="21295" y="812"/>
+                  </a:cubicBezTo>
+                  <a:cubicBezTo>
+                    <a:pt x="21394" y="1077"/>
+                    <a:pt x="21472" y="1399"/>
+                    <a:pt x="21522" y="1759"/>
+                  </a:cubicBezTo>
+                  <a:cubicBezTo>
+                    <a:pt x="21561" y="2088"/>
+                    <a:pt x="21580" y="2408"/>
+                    <a:pt x="21590" y="2800"/>
+                  </a:cubicBezTo>
+                  <a:cubicBezTo>
+                    <a:pt x="21600" y="3192"/>
+                    <a:pt x="21600" y="3657"/>
+                    <a:pt x="21600" y="4277"/>
+                  </a:cubicBezTo>
+                  <a:lnTo>
+                    <a:pt x="21600" y="17342"/>
+                  </a:lnTo>
+                  <a:cubicBezTo>
+                    <a:pt x="21600" y="17952"/>
+                    <a:pt x="21600" y="18412"/>
+                    <a:pt x="21590" y="18802"/>
+                  </a:cubicBezTo>
+                  <a:cubicBezTo>
+                    <a:pt x="21580" y="19192"/>
+                    <a:pt x="21561" y="19512"/>
+                    <a:pt x="21522" y="19841"/>
+                  </a:cubicBezTo>
+                  <a:cubicBezTo>
+                    <a:pt x="21472" y="20201"/>
+                    <a:pt x="21394" y="20523"/>
+                    <a:pt x="21295" y="20788"/>
+                  </a:cubicBezTo>
+                  <a:cubicBezTo>
+                    <a:pt x="21195" y="21053"/>
+                    <a:pt x="21074" y="21260"/>
+                    <a:pt x="20939" y="21391"/>
+                  </a:cubicBezTo>
+                  <a:cubicBezTo>
+                    <a:pt x="20815" y="21496"/>
+                    <a:pt x="20695" y="21548"/>
+                    <a:pt x="20548" y="21574"/>
+                  </a:cubicBezTo>
+                  <a:cubicBezTo>
+                    <a:pt x="20400" y="21600"/>
+                    <a:pt x="20225" y="21600"/>
+                    <a:pt x="19992" y="21600"/>
+                  </a:cubicBezTo>
+                  <a:lnTo>
+                    <a:pt x="1600" y="21600"/>
+                  </a:lnTo>
+                  <a:cubicBezTo>
+                    <a:pt x="1371" y="21600"/>
+                    <a:pt x="1198" y="21600"/>
+                    <a:pt x="1051" y="21574"/>
+                  </a:cubicBezTo>
+                  <a:cubicBezTo>
+                    <a:pt x="905" y="21548"/>
+                    <a:pt x="785" y="21496"/>
+                    <a:pt x="661" y="21391"/>
+                  </a:cubicBezTo>
+                  <a:cubicBezTo>
+                    <a:pt x="526" y="21260"/>
+                    <a:pt x="405" y="21053"/>
+                    <a:pt x="305" y="20788"/>
+                  </a:cubicBezTo>
+                  <a:cubicBezTo>
+                    <a:pt x="206" y="20523"/>
+                    <a:pt x="128" y="20201"/>
+                    <a:pt x="78" y="19841"/>
+                  </a:cubicBezTo>
+                  <a:cubicBezTo>
+                    <a:pt x="39" y="19512"/>
+                    <a:pt x="20" y="19192"/>
+                    <a:pt x="10" y="18800"/>
+                  </a:cubicBezTo>
+                  <a:cubicBezTo>
+                    <a:pt x="0" y="18408"/>
+                    <a:pt x="0" y="17943"/>
+                    <a:pt x="0" y="17323"/>
+                  </a:cubicBezTo>
+                  <a:lnTo>
+                    <a:pt x="0" y="4258"/>
+                  </a:lnTo>
+                  <a:cubicBezTo>
+                    <a:pt x="0" y="3648"/>
+                    <a:pt x="0" y="3188"/>
+                    <a:pt x="10" y="2798"/>
+                  </a:cubicBezTo>
+                  <a:cubicBezTo>
+                    <a:pt x="20" y="2408"/>
+                    <a:pt x="39" y="2088"/>
+                    <a:pt x="78" y="1759"/>
+                  </a:cubicBezTo>
+                  <a:cubicBezTo>
+                    <a:pt x="128" y="1399"/>
+                    <a:pt x="206" y="1077"/>
+                    <a:pt x="305" y="812"/>
+                  </a:cubicBezTo>
+                  <a:cubicBezTo>
+                    <a:pt x="405" y="547"/>
+                    <a:pt x="526" y="340"/>
+                    <a:pt x="661" y="209"/>
+                  </a:cubicBezTo>
+                  <a:cubicBezTo>
+                    <a:pt x="785" y="104"/>
+                    <a:pt x="905" y="52"/>
+                    <a:pt x="1052" y="26"/>
+                  </a:cubicBezTo>
+                  <a:cubicBezTo>
+                    <a:pt x="1200" y="0"/>
+                    <a:pt x="1375" y="0"/>
+                    <a:pt x="1608" y="0"/>
+                  </a:cubicBezTo>
+                  <a:lnTo>
+                    <a:pt x="1600" y="0"/>
+                  </a:lnTo>
+                  <a:close/>
+                </a:path>
+              </a:pathLst>
+            </a:custGeom>
+            <a:solidFill>
+              <a:schemeClr val="accent1"/>
+            </a:solidFill>
+            <a:ln w="12700" cap="flat">
+              <a:noFill/>
+              <a:miter lim="400000"/>
+            </a:ln>
+            <a:effectLst/>
+            <a:extLst>
+              <a:ext uri="{C572A759-6A51-4108-AA02-DFA0A04FC94B}">
+                <ma14:wrappingTextBoxFlag xmlns:ma14="http://schemas.microsoft.com/office/mac/drawingml/2011/main" val="1"/>
+              </a:ext>
+            </a:extLst>
+          </p:spPr>
+          <p:txBody>
+            <a:bodyPr wrap="square" lIns="50800" tIns="50800" rIns="50800" bIns="50800" numCol="1" anchor="ctr">
+              <a:noAutofit/>
+            </a:bodyPr>
+            <a:lstStyle>
+              <a:lvl1pPr>
+                <a:defRPr b="0" sz="1800">
+                  <a:solidFill>
+                    <a:srgbClr val="FFFFFF"/>
+                  </a:solidFill>
+                  <a:latin typeface="+mn-lt"/>
+                  <a:ea typeface="+mn-ea"/>
+                  <a:cs typeface="+mn-cs"/>
+                  <a:sym typeface="Helvetica Neue Medium"/>
+                </a:defRPr>
+              </a:lvl1pPr>
+            </a:lstStyle>
+            <a:p>
+              <a:pPr/>
+              <a:r>
+                <a:t>context definition</a:t>
+              </a:r>
+            </a:p>
+          </p:txBody>
+        </p:sp>
+        <p:sp>
+          <p:nvSpPr>
+            <p:cNvPr id="133" name="command"/>
+            <p:cNvSpPr/>
+            <p:nvPr/>
+          </p:nvSpPr>
+          <p:spPr>
+            <a:xfrm>
+              <a:off x="151583" y="1734696"/>
+              <a:ext cx="609811" cy="108274"/>
+            </a:xfrm>
+            <a:prstGeom prst="roundRect">
+              <a:avLst>
+                <a:gd name="adj" fmla="val 27298"/>
+              </a:avLst>
+            </a:prstGeom>
+            <a:solidFill>
+              <a:srgbClr val="FF5126"/>
+            </a:solidFill>
+            <a:ln w="12700" cap="flat">
+              <a:noFill/>
+              <a:miter lim="400000"/>
+            </a:ln>
+            <a:effectLst/>
+            <a:extLst>
+              <a:ext uri="{C572A759-6A51-4108-AA02-DFA0A04FC94B}">
+                <ma14:wrappingTextBoxFlag xmlns:ma14="http://schemas.microsoft.com/office/mac/drawingml/2011/main" val="1"/>
+              </a:ext>
+            </a:extLst>
+          </p:spPr>
+          <p:txBody>
+            <a:bodyPr wrap="square" lIns="50800" tIns="50800" rIns="50800" bIns="50800" numCol="1" anchor="ctr">
+              <a:noAutofit/>
+            </a:bodyPr>
+            <a:lstStyle>
+              <a:lvl1pPr>
+                <a:defRPr b="0" sz="1400">
+                  <a:solidFill>
+                    <a:srgbClr val="FFFFFF"/>
+                  </a:solidFill>
+                  <a:latin typeface="+mn-lt"/>
+                  <a:ea typeface="+mn-ea"/>
+                  <a:cs typeface="+mn-cs"/>
+                  <a:sym typeface="Helvetica Neue Medium"/>
+                </a:defRPr>
+              </a:lvl1pPr>
+            </a:lstStyle>
+            <a:p>
+              <a:pPr/>
+              <a:r>
+                <a:t>command</a:t>
+              </a:r>
+            </a:p>
+          </p:txBody>
+        </p:sp>
+        <p:sp>
+          <p:nvSpPr>
+            <p:cNvPr id="134" name="command"/>
+            <p:cNvSpPr/>
+            <p:nvPr/>
+          </p:nvSpPr>
+          <p:spPr>
+            <a:xfrm>
+              <a:off x="151583" y="1858230"/>
+              <a:ext cx="609811" cy="108274"/>
+            </a:xfrm>
+            <a:prstGeom prst="roundRect">
+              <a:avLst>
+                <a:gd name="adj" fmla="val 27298"/>
+              </a:avLst>
+            </a:prstGeom>
+            <a:solidFill>
+              <a:srgbClr val="FF5126"/>
+            </a:solidFill>
+            <a:ln w="12700" cap="flat">
+              <a:noFill/>
+              <a:miter lim="400000"/>
+            </a:ln>
+            <a:effectLst/>
+            <a:extLst>
+              <a:ext uri="{C572A759-6A51-4108-AA02-DFA0A04FC94B}">
+                <ma14:wrappingTextBoxFlag xmlns:ma14="http://schemas.microsoft.com/office/mac/drawingml/2011/main" val="1"/>
+              </a:ext>
+            </a:extLst>
+          </p:spPr>
+          <p:txBody>
+            <a:bodyPr wrap="square" lIns="50800" tIns="50800" rIns="50800" bIns="50800" numCol="1" anchor="ctr">
+              <a:noAutofit/>
+            </a:bodyPr>
+            <a:lstStyle>
+              <a:lvl1pPr>
+                <a:defRPr b="0" sz="1400">
+                  <a:solidFill>
+                    <a:srgbClr val="FFFFFF"/>
+                  </a:solidFill>
+                  <a:latin typeface="+mn-lt"/>
+                  <a:ea typeface="+mn-ea"/>
+                  <a:cs typeface="+mn-cs"/>
+                  <a:sym typeface="Helvetica Neue Medium"/>
+                </a:defRPr>
+              </a:lvl1pPr>
+            </a:lstStyle>
+            <a:p>
+              <a:pPr/>
+              <a:r>
+                <a:t>command</a:t>
+              </a:r>
+            </a:p>
+          </p:txBody>
+        </p:sp>
+        <p:sp>
+          <p:nvSpPr>
+            <p:cNvPr id="135" name="command"/>
+            <p:cNvSpPr/>
+            <p:nvPr/>
+          </p:nvSpPr>
+          <p:spPr>
+            <a:xfrm>
+              <a:off x="151583" y="1981764"/>
+              <a:ext cx="609811" cy="108274"/>
+            </a:xfrm>
+            <a:prstGeom prst="roundRect">
+              <a:avLst>
+                <a:gd name="adj" fmla="val 27298"/>
+              </a:avLst>
+            </a:prstGeom>
+            <a:solidFill>
+              <a:srgbClr val="FF5126"/>
+            </a:solidFill>
+            <a:ln w="12700" cap="flat">
+              <a:noFill/>
+              <a:miter lim="400000"/>
+            </a:ln>
+            <a:effectLst/>
+            <a:extLst>
+              <a:ext uri="{C572A759-6A51-4108-AA02-DFA0A04FC94B}">
+                <ma14:wrappingTextBoxFlag xmlns:ma14="http://schemas.microsoft.com/office/mac/drawingml/2011/main" val="1"/>
+              </a:ext>
+            </a:extLst>
+          </p:spPr>
+          <p:txBody>
+            <a:bodyPr wrap="square" lIns="50800" tIns="50800" rIns="50800" bIns="50800" numCol="1" anchor="ctr">
+              <a:noAutofit/>
+            </a:bodyPr>
+            <a:lstStyle>
+              <a:lvl1pPr>
+                <a:defRPr b="0" sz="1400">
+                  <a:solidFill>
+                    <a:srgbClr val="FFFFFF"/>
+                  </a:solidFill>
+                  <a:latin typeface="+mn-lt"/>
+                  <a:ea typeface="+mn-ea"/>
+                  <a:cs typeface="+mn-cs"/>
+                  <a:sym typeface="Helvetica Neue Medium"/>
+                </a:defRPr>
+              </a:lvl1pPr>
+            </a:lstStyle>
+            <a:p>
+              <a:pPr/>
+              <a:r>
+                <a:t>command</a:t>
+              </a:r>
+            </a:p>
+          </p:txBody>
+        </p:sp>
+        <p:sp>
+          <p:nvSpPr>
+            <p:cNvPr id="136" name="Rectangle"/>
+            <p:cNvSpPr/>
+            <p:nvPr/>
+          </p:nvSpPr>
+          <p:spPr>
+            <a:xfrm>
+              <a:off x="2072438" y="1213946"/>
+              <a:ext cx="821943" cy="1084136"/>
+            </a:xfrm>
+            <a:prstGeom prst="rect">
+              <a:avLst/>
+            </a:prstGeom>
+            <a:solidFill>
+              <a:srgbClr val="D7D500">
+                <a:alpha val="58350"/>
+              </a:srgbClr>
+            </a:solidFill>
+            <a:ln w="63500" cap="flat">
+              <a:solidFill>
+                <a:srgbClr val="000000"/>
+              </a:solidFill>
+              <a:prstDash val="solid"/>
+              <a:miter lim="400000"/>
+            </a:ln>
+            <a:effectLst/>
+          </p:spPr>
+          <p:txBody>
+            <a:bodyPr wrap="square" lIns="50800" tIns="50800" rIns="50800" bIns="50800" numCol="1" anchor="ctr">
+              <a:noAutofit/>
+            </a:bodyPr>
+            <a:lstStyle/>
+            <a:p>
+              <a:pPr>
+                <a:defRPr b="0" sz="2200">
+                  <a:solidFill>
+                    <a:srgbClr val="FFFFFF"/>
+                  </a:solidFill>
+                  <a:latin typeface="+mn-lt"/>
+                  <a:ea typeface="+mn-ea"/>
+                  <a:cs typeface="+mn-cs"/>
+                  <a:sym typeface="Helvetica Neue Medium"/>
+                </a:defRPr>
+              </a:pPr>
+            </a:p>
+          </p:txBody>
+        </p:sp>
+        <p:sp>
+          <p:nvSpPr>
+            <p:cNvPr id="137" name="C"/>
+            <p:cNvSpPr txBox="1"/>
+            <p:nvPr/>
+          </p:nvSpPr>
+          <p:spPr>
+            <a:xfrm>
+              <a:off x="2079153" y="1234301"/>
+              <a:ext cx="111844" cy="151598"/>
+            </a:xfrm>
+            <a:prstGeom prst="rect">
+              <a:avLst/>
+            </a:prstGeom>
+            <a:noFill/>
+            <a:ln w="12700" cap="flat">
+              <a:noFill/>
+              <a:miter lim="400000"/>
+            </a:ln>
+            <a:effectLst/>
+            <a:extLst>
+              <a:ext uri="{C572A759-6A51-4108-AA02-DFA0A04FC94B}">
+                <ma14:wrappingTextBoxFlag xmlns:ma14="http://schemas.microsoft.com/office/mac/drawingml/2011/main" val="1"/>
+              </a:ext>
+            </a:extLst>
+          </p:spPr>
+          <p:txBody>
+            <a:bodyPr wrap="square" lIns="50800" tIns="50800" rIns="50800" bIns="50800" numCol="1" anchor="ctr">
+              <a:noAutofit/>
+            </a:bodyPr>
+            <a:lstStyle/>
+            <a:p>
+              <a:pPr/>
+              <a:r>
+                <a:t>C</a:t>
+              </a:r>
+            </a:p>
+          </p:txBody>
+        </p:sp>
+        <p:sp>
+          <p:nvSpPr>
+            <p:cNvPr id="138" name="header"/>
+            <p:cNvSpPr/>
+            <p:nvPr/>
+          </p:nvSpPr>
+          <p:spPr>
+            <a:xfrm>
+              <a:off x="2256172" y="1303723"/>
+              <a:ext cx="609810" cy="151598"/>
+            </a:xfrm>
+            <a:prstGeom prst="roundRect">
+              <a:avLst>
+                <a:gd name="adj" fmla="val 19497"/>
+              </a:avLst>
+            </a:prstGeom>
+            <a:solidFill>
+              <a:schemeClr val="accent1"/>
+            </a:solidFill>
+            <a:ln w="12700" cap="flat">
+              <a:noFill/>
+              <a:miter lim="400000"/>
+            </a:ln>
+            <a:effectLst/>
+            <a:extLst>
+              <a:ext uri="{C572A759-6A51-4108-AA02-DFA0A04FC94B}">
+                <ma14:wrappingTextBoxFlag xmlns:ma14="http://schemas.microsoft.com/office/mac/drawingml/2011/main" val="1"/>
+              </a:ext>
+            </a:extLst>
+          </p:spPr>
+          <p:txBody>
+            <a:bodyPr wrap="square" lIns="50800" tIns="50800" rIns="50800" bIns="50800" numCol="1" anchor="ctr">
+              <a:noAutofit/>
+            </a:bodyPr>
+            <a:lstStyle>
+              <a:lvl1pPr>
+                <a:defRPr b="0" sz="1800">
+                  <a:solidFill>
+                    <a:srgbClr val="FFFFFF"/>
+                  </a:solidFill>
+                  <a:latin typeface="+mn-lt"/>
+                  <a:ea typeface="+mn-ea"/>
+                  <a:cs typeface="+mn-cs"/>
+                  <a:sym typeface="Helvetica Neue Medium"/>
+                </a:defRPr>
+              </a:lvl1pPr>
+            </a:lstStyle>
+            <a:p>
+              <a:pPr/>
+              <a:r>
+                <a:t>header</a:t>
+              </a:r>
+            </a:p>
+          </p:txBody>
+        </p:sp>
+        <p:sp>
+          <p:nvSpPr>
+            <p:cNvPr id="139" name="context…"/>
+            <p:cNvSpPr/>
+            <p:nvPr/>
+          </p:nvSpPr>
+          <p:spPr>
+            <a:xfrm>
+              <a:off x="2256172" y="1473616"/>
+              <a:ext cx="609810" cy="229191"/>
+            </a:xfrm>
+            <a:prstGeom prst="roundRect">
+              <a:avLst>
+                <a:gd name="adj" fmla="val 12896"/>
+              </a:avLst>
+            </a:prstGeom>
+            <a:solidFill>
+              <a:schemeClr val="accent1"/>
+            </a:solidFill>
+            <a:ln w="12700" cap="flat">
+              <a:noFill/>
+              <a:miter lim="400000"/>
+            </a:ln>
+            <a:effectLst/>
+            <a:extLst>
+              <a:ext uri="{C572A759-6A51-4108-AA02-DFA0A04FC94B}">
+                <ma14:wrappingTextBoxFlag xmlns:ma14="http://schemas.microsoft.com/office/mac/drawingml/2011/main" val="1"/>
+              </a:ext>
+            </a:extLst>
+          </p:spPr>
+          <p:txBody>
+            <a:bodyPr wrap="square" lIns="50800" tIns="50800" rIns="50800" bIns="50800" numCol="1" anchor="ctr">
+              <a:noAutofit/>
+            </a:bodyPr>
+            <a:lstStyle/>
+            <a:p>
+              <a:pPr>
+                <a:defRPr b="0" sz="1800">
+                  <a:solidFill>
+                    <a:srgbClr val="FFFFFF"/>
+                  </a:solidFill>
+                  <a:latin typeface="+mn-lt"/>
+                  <a:ea typeface="+mn-ea"/>
+                  <a:cs typeface="+mn-cs"/>
+                  <a:sym typeface="Helvetica Neue Medium"/>
+                </a:defRPr>
+              </a:pPr>
+              <a:r>
+                <a:t>context</a:t>
+              </a:r>
+            </a:p>
+            <a:p>
+              <a:pPr>
+                <a:defRPr b="0" sz="1800">
+                  <a:solidFill>
+                    <a:srgbClr val="FFFFFF"/>
+                  </a:solidFill>
+                  <a:latin typeface="+mn-lt"/>
+                  <a:ea typeface="+mn-ea"/>
+                  <a:cs typeface="+mn-cs"/>
+                  <a:sym typeface="Helvetica Neue Medium"/>
+                </a:defRPr>
+              </a:pPr>
+              <a:r>
+                <a:t>definition</a:t>
+              </a:r>
+            </a:p>
+          </p:txBody>
+        </p:sp>
+        <p:sp>
+          <p:nvSpPr>
+            <p:cNvPr id="140" name="command"/>
+            <p:cNvSpPr/>
+            <p:nvPr/>
+          </p:nvSpPr>
+          <p:spPr>
+            <a:xfrm>
+              <a:off x="2247820" y="1710339"/>
+              <a:ext cx="609811" cy="108274"/>
+            </a:xfrm>
+            <a:prstGeom prst="roundRect">
+              <a:avLst>
+                <a:gd name="adj" fmla="val 27298"/>
+              </a:avLst>
+            </a:prstGeom>
+            <a:solidFill>
+              <a:srgbClr val="FF5126"/>
+            </a:solidFill>
+            <a:ln w="12700" cap="flat">
+              <a:noFill/>
+              <a:miter lim="400000"/>
+            </a:ln>
+            <a:effectLst/>
+            <a:extLst>
+              <a:ext uri="{C572A759-6A51-4108-AA02-DFA0A04FC94B}">
+                <ma14:wrappingTextBoxFlag xmlns:ma14="http://schemas.microsoft.com/office/mac/drawingml/2011/main" val="1"/>
+              </a:ext>
+            </a:extLst>
+          </p:spPr>
+          <p:txBody>
+            <a:bodyPr wrap="square" lIns="50800" tIns="50800" rIns="50800" bIns="50800" numCol="1" anchor="ctr">
+              <a:noAutofit/>
+            </a:bodyPr>
+            <a:lstStyle>
+              <a:lvl1pPr>
+                <a:defRPr b="0" sz="1400">
+                  <a:solidFill>
+                    <a:srgbClr val="FFFFFF"/>
+                  </a:solidFill>
+                  <a:latin typeface="+mn-lt"/>
+                  <a:ea typeface="+mn-ea"/>
+                  <a:cs typeface="+mn-cs"/>
+                  <a:sym typeface="Helvetica Neue Medium"/>
+                </a:defRPr>
+              </a:lvl1pPr>
+            </a:lstStyle>
+            <a:p>
+              <a:pPr/>
+              <a:r>
+                <a:t>command</a:t>
+              </a:r>
+            </a:p>
+          </p:txBody>
+        </p:sp>
+        <p:sp>
+          <p:nvSpPr>
+            <p:cNvPr id="141" name="command"/>
+            <p:cNvSpPr/>
+            <p:nvPr/>
+          </p:nvSpPr>
+          <p:spPr>
+            <a:xfrm>
+              <a:off x="2247820" y="1831436"/>
+              <a:ext cx="609811" cy="108274"/>
+            </a:xfrm>
+            <a:prstGeom prst="roundRect">
+              <a:avLst>
+                <a:gd name="adj" fmla="val 27298"/>
+              </a:avLst>
+            </a:prstGeom>
+            <a:solidFill>
+              <a:srgbClr val="FF5126"/>
+            </a:solidFill>
+            <a:ln w="12700" cap="flat">
+              <a:noFill/>
+              <a:miter lim="400000"/>
+            </a:ln>
+            <a:effectLst/>
+            <a:extLst>
+              <a:ext uri="{C572A759-6A51-4108-AA02-DFA0A04FC94B}">
+                <ma14:wrappingTextBoxFlag xmlns:ma14="http://schemas.microsoft.com/office/mac/drawingml/2011/main" val="1"/>
+              </a:ext>
+            </a:extLst>
+          </p:spPr>
+          <p:txBody>
+            <a:bodyPr wrap="square" lIns="50800" tIns="50800" rIns="50800" bIns="50800" numCol="1" anchor="ctr">
+              <a:noAutofit/>
+            </a:bodyPr>
+            <a:lstStyle>
+              <a:lvl1pPr>
+                <a:defRPr b="0" sz="1400">
+                  <a:solidFill>
+                    <a:srgbClr val="FFFFFF"/>
+                  </a:solidFill>
+                  <a:latin typeface="+mn-lt"/>
+                  <a:ea typeface="+mn-ea"/>
+                  <a:cs typeface="+mn-cs"/>
+                  <a:sym typeface="Helvetica Neue Medium"/>
+                </a:defRPr>
+              </a:lvl1pPr>
+            </a:lstStyle>
+            <a:p>
+              <a:pPr/>
+              <a:r>
+                <a:t>command</a:t>
+              </a:r>
+            </a:p>
+          </p:txBody>
+        </p:sp>
+        <p:sp>
+          <p:nvSpPr>
+            <p:cNvPr id="142" name="command"/>
+            <p:cNvSpPr/>
+            <p:nvPr/>
+          </p:nvSpPr>
+          <p:spPr>
+            <a:xfrm>
+              <a:off x="2247820" y="1952534"/>
+              <a:ext cx="609811" cy="108274"/>
+            </a:xfrm>
+            <a:prstGeom prst="roundRect">
+              <a:avLst>
+                <a:gd name="adj" fmla="val 27298"/>
+              </a:avLst>
+            </a:prstGeom>
+            <a:solidFill>
+              <a:srgbClr val="FF5126"/>
+            </a:solidFill>
+            <a:ln w="12700" cap="flat">
+              <a:noFill/>
+              <a:miter lim="400000"/>
+            </a:ln>
+            <a:effectLst/>
+            <a:extLst>
+              <a:ext uri="{C572A759-6A51-4108-AA02-DFA0A04FC94B}">
+                <ma14:wrappingTextBoxFlag xmlns:ma14="http://schemas.microsoft.com/office/mac/drawingml/2011/main" val="1"/>
+              </a:ext>
+            </a:extLst>
+          </p:spPr>
+          <p:txBody>
+            <a:bodyPr wrap="square" lIns="50800" tIns="50800" rIns="50800" bIns="50800" numCol="1" anchor="ctr">
+              <a:noAutofit/>
+            </a:bodyPr>
+            <a:lstStyle>
+              <a:lvl1pPr>
+                <a:defRPr b="0" sz="1400">
+                  <a:solidFill>
+                    <a:srgbClr val="FFFFFF"/>
+                  </a:solidFill>
+                  <a:latin typeface="+mn-lt"/>
+                  <a:ea typeface="+mn-ea"/>
+                  <a:cs typeface="+mn-cs"/>
+                  <a:sym typeface="Helvetica Neue Medium"/>
+                </a:defRPr>
+              </a:lvl1pPr>
+            </a:lstStyle>
+            <a:p>
+              <a:pPr/>
+              <a:r>
+                <a:t>command</a:t>
+              </a:r>
+            </a:p>
+          </p:txBody>
+        </p:sp>
+        <p:sp>
+          <p:nvSpPr>
+            <p:cNvPr id="143" name="command"/>
+            <p:cNvSpPr/>
+            <p:nvPr/>
+          </p:nvSpPr>
+          <p:spPr>
+            <a:xfrm>
+              <a:off x="2247820" y="2073631"/>
+              <a:ext cx="609811" cy="108274"/>
+            </a:xfrm>
+            <a:prstGeom prst="roundRect">
+              <a:avLst>
+                <a:gd name="adj" fmla="val 27298"/>
+              </a:avLst>
+            </a:prstGeom>
+            <a:solidFill>
+              <a:srgbClr val="FF5126"/>
+            </a:solidFill>
+            <a:ln w="12700" cap="flat">
+              <a:noFill/>
+              <a:miter lim="400000"/>
+            </a:ln>
+            <a:effectLst/>
+            <a:extLst>
+              <a:ext uri="{C572A759-6A51-4108-AA02-DFA0A04FC94B}">
+                <ma14:wrappingTextBoxFlag xmlns:ma14="http://schemas.microsoft.com/office/mac/drawingml/2011/main" val="1"/>
+              </a:ext>
+            </a:extLst>
+          </p:spPr>
+          <p:txBody>
+            <a:bodyPr wrap="square" lIns="50800" tIns="50800" rIns="50800" bIns="50800" numCol="1" anchor="ctr">
+              <a:noAutofit/>
+            </a:bodyPr>
+            <a:lstStyle>
+              <a:lvl1pPr>
+                <a:defRPr b="0" sz="1400">
+                  <a:solidFill>
+                    <a:srgbClr val="FFFFFF"/>
+                  </a:solidFill>
+                  <a:latin typeface="+mn-lt"/>
+                  <a:ea typeface="+mn-ea"/>
+                  <a:cs typeface="+mn-cs"/>
+                  <a:sym typeface="Helvetica Neue Medium"/>
+                </a:defRPr>
+              </a:lvl1pPr>
+            </a:lstStyle>
+            <a:p>
+              <a:pPr/>
+              <a:r>
+                <a:t>command</a:t>
+              </a:r>
+            </a:p>
+          </p:txBody>
+        </p:sp>
+        <p:sp>
+          <p:nvSpPr>
+            <p:cNvPr id="144" name="Rectangle"/>
+            <p:cNvSpPr/>
+            <p:nvPr/>
+          </p:nvSpPr>
+          <p:spPr>
+            <a:xfrm>
+              <a:off x="1066077" y="2094361"/>
+              <a:ext cx="837243" cy="992045"/>
+            </a:xfrm>
+            <a:prstGeom prst="rect">
+              <a:avLst/>
+            </a:prstGeom>
+            <a:solidFill>
+              <a:srgbClr val="D7D500">
+                <a:alpha val="58350"/>
+              </a:srgbClr>
+            </a:solidFill>
+            <a:ln w="63500" cap="flat">
+              <a:solidFill>
+                <a:srgbClr val="000000"/>
+              </a:solidFill>
+              <a:prstDash val="solid"/>
+              <a:miter lim="400000"/>
+            </a:ln>
+            <a:effectLst/>
+          </p:spPr>
+          <p:txBody>
+            <a:bodyPr wrap="square" lIns="50800" tIns="50800" rIns="50800" bIns="50800" numCol="1" anchor="ctr">
+              <a:noAutofit/>
+            </a:bodyPr>
+            <a:lstStyle/>
+            <a:p>
+              <a:pPr>
+                <a:defRPr b="0" sz="2200">
+                  <a:solidFill>
+                    <a:srgbClr val="FFFFFF"/>
+                  </a:solidFill>
+                  <a:latin typeface="+mn-lt"/>
+                  <a:ea typeface="+mn-ea"/>
+                  <a:cs typeface="+mn-cs"/>
+                  <a:sym typeface="Helvetica Neue Medium"/>
+                </a:defRPr>
+              </a:pPr>
+            </a:p>
+          </p:txBody>
+        </p:sp>
+        <p:sp>
+          <p:nvSpPr>
+            <p:cNvPr id="145" name="D"/>
+            <p:cNvSpPr txBox="1"/>
+            <p:nvPr/>
+          </p:nvSpPr>
+          <p:spPr>
+            <a:xfrm>
+              <a:off x="1072792" y="2106254"/>
+              <a:ext cx="111845" cy="151598"/>
+            </a:xfrm>
+            <a:prstGeom prst="rect">
+              <a:avLst/>
+            </a:prstGeom>
+            <a:noFill/>
+            <a:ln w="12700" cap="flat">
+              <a:noFill/>
+              <a:miter lim="400000"/>
+            </a:ln>
+            <a:effectLst/>
+            <a:extLst>
+              <a:ext uri="{C572A759-6A51-4108-AA02-DFA0A04FC94B}">
+                <ma14:wrappingTextBoxFlag xmlns:ma14="http://schemas.microsoft.com/office/mac/drawingml/2011/main" val="1"/>
+              </a:ext>
+            </a:extLst>
+          </p:spPr>
+          <p:txBody>
+            <a:bodyPr wrap="square" lIns="50800" tIns="50800" rIns="50800" bIns="50800" numCol="1" anchor="ctr">
+              <a:noAutofit/>
+            </a:bodyPr>
+            <a:lstStyle/>
+            <a:p>
+              <a:pPr/>
+              <a:r>
+                <a:t>D</a:t>
+              </a:r>
+            </a:p>
+          </p:txBody>
+        </p:sp>
+        <p:sp>
+          <p:nvSpPr>
+            <p:cNvPr id="146" name="header"/>
+            <p:cNvSpPr/>
+            <p:nvPr/>
+          </p:nvSpPr>
+          <p:spPr>
+            <a:xfrm>
+              <a:off x="1241460" y="2135485"/>
+              <a:ext cx="609810" cy="151597"/>
+            </a:xfrm>
+            <a:prstGeom prst="roundRect">
+              <a:avLst>
+                <a:gd name="adj" fmla="val 19497"/>
+              </a:avLst>
+            </a:prstGeom>
+            <a:solidFill>
+              <a:schemeClr val="accent1"/>
+            </a:solidFill>
+            <a:ln w="12700" cap="flat">
+              <a:noFill/>
+              <a:miter lim="400000"/>
+            </a:ln>
+            <a:effectLst/>
+            <a:extLst>
+              <a:ext uri="{C572A759-6A51-4108-AA02-DFA0A04FC94B}">
+                <ma14:wrappingTextBoxFlag xmlns:ma14="http://schemas.microsoft.com/office/mac/drawingml/2011/main" val="1"/>
+              </a:ext>
+            </a:extLst>
+          </p:spPr>
+          <p:txBody>
+            <a:bodyPr wrap="square" lIns="50800" tIns="50800" rIns="50800" bIns="50800" numCol="1" anchor="ctr">
+              <a:noAutofit/>
+            </a:bodyPr>
+            <a:lstStyle>
+              <a:lvl1pPr>
+                <a:defRPr b="0" sz="1800">
+                  <a:solidFill>
+                    <a:srgbClr val="FFFFFF"/>
+                  </a:solidFill>
+                  <a:latin typeface="+mn-lt"/>
+                  <a:ea typeface="+mn-ea"/>
+                  <a:cs typeface="+mn-cs"/>
+                  <a:sym typeface="Helvetica Neue Medium"/>
+                </a:defRPr>
+              </a:lvl1pPr>
+            </a:lstStyle>
+            <a:p>
+              <a:pPr/>
+              <a:r>
+                <a:t>header</a:t>
+              </a:r>
+            </a:p>
+          </p:txBody>
+        </p:sp>
+        <p:sp>
+          <p:nvSpPr>
+            <p:cNvPr id="147" name="context…"/>
+            <p:cNvSpPr/>
+            <p:nvPr/>
+          </p:nvSpPr>
+          <p:spPr>
+            <a:xfrm>
+              <a:off x="1241460" y="2289878"/>
+              <a:ext cx="609810" cy="229192"/>
+            </a:xfrm>
+            <a:prstGeom prst="roundRect">
+              <a:avLst>
+                <a:gd name="adj" fmla="val 12896"/>
+              </a:avLst>
+            </a:prstGeom>
+            <a:solidFill>
+              <a:schemeClr val="accent1"/>
+            </a:solidFill>
+            <a:ln w="12700" cap="flat">
+              <a:noFill/>
+              <a:miter lim="400000"/>
+            </a:ln>
+            <a:effectLst/>
+            <a:extLst>
+              <a:ext uri="{C572A759-6A51-4108-AA02-DFA0A04FC94B}">
+                <ma14:wrappingTextBoxFlag xmlns:ma14="http://schemas.microsoft.com/office/mac/drawingml/2011/main" val="1"/>
+              </a:ext>
+            </a:extLst>
+          </p:spPr>
+          <p:txBody>
+            <a:bodyPr wrap="square" lIns="50800" tIns="50800" rIns="50800" bIns="50800" numCol="1" anchor="ctr">
+              <a:noAutofit/>
+            </a:bodyPr>
+            <a:lstStyle/>
+            <a:p>
+              <a:pPr>
+                <a:defRPr b="0" sz="1800">
+                  <a:solidFill>
+                    <a:srgbClr val="FFFFFF"/>
+                  </a:solidFill>
+                  <a:latin typeface="+mn-lt"/>
+                  <a:ea typeface="+mn-ea"/>
+                  <a:cs typeface="+mn-cs"/>
+                  <a:sym typeface="Helvetica Neue Medium"/>
+                </a:defRPr>
+              </a:pPr>
+              <a:r>
+                <a:t>context</a:t>
+              </a:r>
+            </a:p>
+            <a:p>
+              <a:pPr>
+                <a:defRPr b="0" sz="1800">
+                  <a:solidFill>
+                    <a:srgbClr val="FFFFFF"/>
+                  </a:solidFill>
+                  <a:latin typeface="+mn-lt"/>
+                  <a:ea typeface="+mn-ea"/>
+                  <a:cs typeface="+mn-cs"/>
+                  <a:sym typeface="Helvetica Neue Medium"/>
+                </a:defRPr>
+              </a:pPr>
+              <a:r>
+                <a:t>definition</a:t>
+              </a:r>
+            </a:p>
+          </p:txBody>
+        </p:sp>
+        <p:sp>
+          <p:nvSpPr>
+            <p:cNvPr id="148" name="command"/>
+            <p:cNvSpPr/>
+            <p:nvPr/>
+          </p:nvSpPr>
+          <p:spPr>
+            <a:xfrm>
+              <a:off x="1241460" y="2555005"/>
+              <a:ext cx="609810" cy="108274"/>
+            </a:xfrm>
+            <a:prstGeom prst="roundRect">
+              <a:avLst>
+                <a:gd name="adj" fmla="val 27298"/>
+              </a:avLst>
+            </a:prstGeom>
+            <a:solidFill>
+              <a:srgbClr val="FF5126"/>
+            </a:solidFill>
+            <a:ln w="12700" cap="flat">
+              <a:noFill/>
+              <a:miter lim="400000"/>
+            </a:ln>
+            <a:effectLst/>
+            <a:extLst>
+              <a:ext uri="{C572A759-6A51-4108-AA02-DFA0A04FC94B}">
+                <ma14:wrappingTextBoxFlag xmlns:ma14="http://schemas.microsoft.com/office/mac/drawingml/2011/main" val="1"/>
+              </a:ext>
+            </a:extLst>
+          </p:spPr>
+          <p:txBody>
+            <a:bodyPr wrap="square" lIns="50800" tIns="50800" rIns="50800" bIns="50800" numCol="1" anchor="ctr">
+              <a:noAutofit/>
+            </a:bodyPr>
+            <a:lstStyle>
+              <a:lvl1pPr>
+                <a:defRPr b="0" sz="1400">
+                  <a:solidFill>
+                    <a:srgbClr val="FFFFFF"/>
+                  </a:solidFill>
+                  <a:latin typeface="+mn-lt"/>
+                  <a:ea typeface="+mn-ea"/>
+                  <a:cs typeface="+mn-cs"/>
+                  <a:sym typeface="Helvetica Neue Medium"/>
+                </a:defRPr>
+              </a:lvl1pPr>
+            </a:lstStyle>
+            <a:p>
+              <a:pPr/>
+              <a:r>
+                <a:t>command</a:t>
+              </a:r>
+            </a:p>
+          </p:txBody>
+        </p:sp>
+        <p:sp>
+          <p:nvSpPr>
+            <p:cNvPr id="149" name="command"/>
+            <p:cNvSpPr/>
+            <p:nvPr/>
+          </p:nvSpPr>
+          <p:spPr>
+            <a:xfrm>
+              <a:off x="1241460" y="2669983"/>
+              <a:ext cx="609810" cy="108274"/>
+            </a:xfrm>
+            <a:prstGeom prst="roundRect">
+              <a:avLst>
+                <a:gd name="adj" fmla="val 27298"/>
+              </a:avLst>
+            </a:prstGeom>
+            <a:solidFill>
+              <a:srgbClr val="FF5126"/>
+            </a:solidFill>
+            <a:ln w="12700" cap="flat">
+              <a:noFill/>
+              <a:miter lim="400000"/>
+            </a:ln>
+            <a:effectLst/>
+            <a:extLst>
+              <a:ext uri="{C572A759-6A51-4108-AA02-DFA0A04FC94B}">
+                <ma14:wrappingTextBoxFlag xmlns:ma14="http://schemas.microsoft.com/office/mac/drawingml/2011/main" val="1"/>
+              </a:ext>
+            </a:extLst>
+          </p:spPr>
+          <p:txBody>
+            <a:bodyPr wrap="square" lIns="50800" tIns="50800" rIns="50800" bIns="50800" numCol="1" anchor="ctr">
+              <a:noAutofit/>
+            </a:bodyPr>
+            <a:lstStyle>
+              <a:lvl1pPr>
+                <a:defRPr b="0" sz="1400">
+                  <a:solidFill>
+                    <a:srgbClr val="FFFFFF"/>
+                  </a:solidFill>
+                  <a:latin typeface="+mn-lt"/>
+                  <a:ea typeface="+mn-ea"/>
+                  <a:cs typeface="+mn-cs"/>
+                  <a:sym typeface="Helvetica Neue Medium"/>
+                </a:defRPr>
+              </a:lvl1pPr>
+            </a:lstStyle>
+            <a:p>
+              <a:pPr/>
+              <a:r>
+                <a:t>command</a:t>
+              </a:r>
+            </a:p>
+          </p:txBody>
+        </p:sp>
+        <p:cxnSp>
+          <p:nvCxnSpPr>
+            <p:cNvPr id="150" name="Connection Line"/>
+            <p:cNvCxnSpPr>
+              <a:stCxn id="129" idx="0"/>
+              <a:endCxn id="132" idx="0"/>
+            </p:cNvCxnSpPr>
+            <p:nvPr/>
+          </p:nvCxnSpPr>
+          <p:spPr>
+            <a:xfrm flipV="1">
+              <a:off x="410970" y="1585873"/>
+              <a:ext cx="45519" cy="141022"/>
+            </a:xfrm>
+            <a:prstGeom prst="straightConnector1">
+              <a:avLst/>
+            </a:prstGeom>
+            <a:ln w="25400" cap="flat">
+              <a:solidFill>
+                <a:srgbClr val="000000"/>
+              </a:solidFill>
+              <a:prstDash val="solid"/>
+              <a:miter lim="400000"/>
+            </a:ln>
+            <a:effectLst/>
+          </p:spPr>
+        </p:cxnSp>
+        <p:cxnSp>
+          <p:nvCxnSpPr>
+            <p:cNvPr id="151" name="Connection Line"/>
+            <p:cNvCxnSpPr>
+              <a:stCxn id="132" idx="0"/>
+              <a:endCxn id="121" idx="0"/>
+            </p:cNvCxnSpPr>
+            <p:nvPr/>
+          </p:nvCxnSpPr>
+          <p:spPr>
+            <a:xfrm flipV="1">
+              <a:off x="457200" y="495300"/>
+              <a:ext cx="1016000" cy="1092200"/>
+            </a:xfrm>
+            <a:prstGeom prst="bentConnector2">
+              <a:avLst/>
+            </a:prstGeom>
+            <a:ln w="38100" cap="flat">
+              <a:solidFill>
+                <a:srgbClr val="000000"/>
+              </a:solidFill>
+              <a:prstDash val="solid"/>
+              <a:miter lim="400000"/>
+              <a:tailEnd type="triangle" w="med" len="med"/>
+            </a:ln>
+            <a:effectLst/>
+          </p:spPr>
+        </p:cxnSp>
+        <p:cxnSp>
+          <p:nvCxnSpPr>
+            <p:cNvPr id="152" name="Connection Line"/>
+            <p:cNvCxnSpPr>
+              <a:stCxn id="121" idx="0"/>
+              <a:endCxn id="139" idx="0"/>
+            </p:cNvCxnSpPr>
+            <p:nvPr/>
+          </p:nvCxnSpPr>
+          <p:spPr>
+            <a:xfrm flipH="1" rot="16200000">
+              <a:off x="1473200" y="495300"/>
+              <a:ext cx="1092200" cy="1092200"/>
+            </a:xfrm>
+            <a:prstGeom prst="bentConnector2">
+              <a:avLst/>
+            </a:prstGeom>
+            <a:ln w="38100" cap="flat">
+              <a:solidFill>
+                <a:srgbClr val="000000"/>
+              </a:solidFill>
+              <a:prstDash val="solid"/>
+              <a:miter lim="400000"/>
+              <a:headEnd type="triangle" w="med" len="med"/>
+            </a:ln>
+            <a:effectLst/>
+          </p:spPr>
+        </p:cxnSp>
+        <p:cxnSp>
+          <p:nvCxnSpPr>
+            <p:cNvPr id="153" name="Connection Line"/>
+            <p:cNvCxnSpPr>
+              <a:stCxn id="129" idx="0"/>
+              <a:endCxn id="147" idx="0"/>
+            </p:cNvCxnSpPr>
+            <p:nvPr/>
+          </p:nvCxnSpPr>
+          <p:spPr>
+            <a:xfrm>
+              <a:off x="406400" y="1727200"/>
+              <a:ext cx="1143000" cy="673100"/>
+            </a:xfrm>
+            <a:prstGeom prst="bentConnector3">
+              <a:avLst>
+                <a:gd name="adj1" fmla="val -59999"/>
+              </a:avLst>
+            </a:prstGeom>
+            <a:ln w="38100" cap="flat">
+              <a:solidFill>
+                <a:srgbClr val="000000"/>
+              </a:solidFill>
+              <a:prstDash val="solid"/>
+              <a:miter lim="400000"/>
+              <a:headEnd type="triangle" w="med" len="med"/>
+            </a:ln>
+            <a:effectLst/>
+          </p:spPr>
+        </p:cxnSp>
+        <p:cxnSp>
+          <p:nvCxnSpPr>
+            <p:cNvPr id="154" name="Connection Line"/>
+            <p:cNvCxnSpPr>
+              <a:stCxn id="136" idx="0"/>
+              <a:endCxn id="147" idx="0"/>
+            </p:cNvCxnSpPr>
+            <p:nvPr/>
+          </p:nvCxnSpPr>
+          <p:spPr>
+            <a:xfrm flipH="1">
+              <a:off x="1549400" y="1752600"/>
+              <a:ext cx="939800" cy="647700"/>
+            </a:xfrm>
+            <a:prstGeom prst="bentConnector3">
+              <a:avLst>
+                <a:gd name="adj1" fmla="val -72972"/>
+              </a:avLst>
+            </a:prstGeom>
+            <a:ln w="38100" cap="flat">
+              <a:solidFill>
+                <a:srgbClr val="000000"/>
+              </a:solidFill>
+              <a:prstDash val="solid"/>
+              <a:miter lim="400000"/>
+              <a:headEnd type="triangle" w="med" len="med"/>
+            </a:ln>
+            <a:effectLst/>
+          </p:spPr>
+        </p:cxnSp>
+      </p:grpSp>
+      <p:sp>
+        <p:nvSpPr>
+          <p:cNvPr id="156" name="Line"/>
+          <p:cNvSpPr/>
+          <p:nvPr/>
+        </p:nvSpPr>
+        <p:spPr>
+          <a:xfrm flipH="1" flipV="1">
+            <a:off x="3121469" y="4754612"/>
+            <a:ext cx="1829243" cy="254702"/>
+          </a:xfrm>
+          <a:prstGeom prst="line">
+            <a:avLst/>
+          </a:prstGeom>
+          <a:ln w="63500">
+            <a:solidFill>
+              <a:srgbClr val="000000"/>
+            </a:solidFill>
+            <a:miter lim="400000"/>
+            <a:tailEnd type="triangle"/>
+          </a:ln>
+        </p:spPr>
+        <p:txBody>
+          <a:bodyPr lIns="50800" tIns="50800" rIns="50800" bIns="50800" anchor="ctr"/>
+          <a:lstStyle/>
+          <a:p>
+            <a:pPr>
+              <a:defRPr b="0" sz="2200">
+                <a:solidFill>
+                  <a:srgbClr val="FFFFFF"/>
+                </a:solidFill>
+                <a:latin typeface="+mn-lt"/>
+                <a:ea typeface="+mn-ea"/>
+                <a:cs typeface="+mn-cs"/>
+                <a:sym typeface="Helvetica Neue Medium"/>
+              </a:defRPr>
+            </a:pPr>
+          </a:p>
+        </p:txBody>
+      </p:sp>
+      <p:sp>
+        <p:nvSpPr>
+          <p:cNvPr id="157" name="SML"/>
           <p:cNvSpPr txBox="1"/>
           <p:nvPr/>
         </p:nvSpPr>
         <p:spPr>
           <a:xfrm>
-            <a:off x="6074155" y="328270"/>
-            <a:ext cx="323089" cy="461060"/>
+            <a:off x="2345842" y="4519270"/>
+            <a:ext cx="769316" cy="461060"/>
           </a:xfrm>
           <a:prstGeom prst="rect">
             <a:avLst/>
@@ -3002,6 +5018,948 @@
           <a:p>
             <a:pPr/>
             <a:r>
+              <a:t>SML</a:t>
+            </a:r>
+          </a:p>
+        </p:txBody>
+      </p:sp>
+      <p:sp>
+        <p:nvSpPr>
+          <p:cNvPr id="158" name="Line"/>
+          <p:cNvSpPr/>
+          <p:nvPr/>
+        </p:nvSpPr>
+        <p:spPr>
+          <a:xfrm flipH="1">
+            <a:off x="1196971" y="4748193"/>
+            <a:ext cx="1111258" cy="1"/>
+          </a:xfrm>
+          <a:prstGeom prst="line">
+            <a:avLst/>
+          </a:prstGeom>
+          <a:ln w="63500">
+            <a:solidFill>
+              <a:srgbClr val="000000"/>
+            </a:solidFill>
+            <a:miter lim="400000"/>
+            <a:tailEnd type="triangle"/>
+          </a:ln>
+        </p:spPr>
+        <p:txBody>
+          <a:bodyPr lIns="50800" tIns="50800" rIns="50800" bIns="50800" anchor="ctr"/>
+          <a:lstStyle/>
+          <a:p>
+            <a:pPr>
+              <a:defRPr b="0" sz="2200">
+                <a:solidFill>
+                  <a:srgbClr val="FFFFFF"/>
+                </a:solidFill>
+                <a:latin typeface="+mn-lt"/>
+                <a:ea typeface="+mn-ea"/>
+                <a:cs typeface="+mn-cs"/>
+                <a:sym typeface="Helvetica Neue Medium"/>
+              </a:defRPr>
+            </a:pPr>
+          </a:p>
+        </p:txBody>
+      </p:sp>
+      <p:sp>
+        <p:nvSpPr>
+          <p:cNvPr id="159" name="JS"/>
+          <p:cNvSpPr txBox="1"/>
+          <p:nvPr/>
+        </p:nvSpPr>
+        <p:spPr>
+          <a:xfrm>
+            <a:off x="673607" y="5393964"/>
+            <a:ext cx="481585" cy="461060"/>
+          </a:xfrm>
+          <a:prstGeom prst="rect">
+            <a:avLst/>
+          </a:prstGeom>
+          <a:ln w="12700">
+            <a:miter lim="400000"/>
+          </a:ln>
+          <a:extLst>
+            <a:ext uri="{C572A759-6A51-4108-AA02-DFA0A04FC94B}">
+              <ma14:wrappingTextBoxFlag xmlns:ma14="http://schemas.microsoft.com/office/mac/drawingml/2011/main" val="1"/>
+            </a:ext>
+          </a:extLst>
+        </p:spPr>
+        <p:txBody>
+          <a:bodyPr wrap="none" lIns="50800" tIns="50800" rIns="50800" bIns="50800" anchor="ctr">
+            <a:spAutoFit/>
+          </a:bodyPr>
+          <a:lstStyle/>
+          <a:p>
+            <a:pPr/>
+            <a:r>
+              <a:t>JS</a:t>
+            </a:r>
+          </a:p>
+        </p:txBody>
+      </p:sp>
+      <p:sp>
+        <p:nvSpPr>
+          <p:cNvPr id="160" name="Line"/>
+          <p:cNvSpPr/>
+          <p:nvPr/>
+        </p:nvSpPr>
+        <p:spPr>
+          <a:xfrm flipH="1">
+            <a:off x="3208865" y="7088975"/>
+            <a:ext cx="1700453" cy="513386"/>
+          </a:xfrm>
+          <a:prstGeom prst="line">
+            <a:avLst/>
+          </a:prstGeom>
+          <a:ln w="63500">
+            <a:solidFill>
+              <a:srgbClr val="000000"/>
+            </a:solidFill>
+            <a:miter lim="400000"/>
+            <a:tailEnd type="triangle"/>
+          </a:ln>
+        </p:spPr>
+        <p:txBody>
+          <a:bodyPr lIns="50800" tIns="50800" rIns="50800" bIns="50800" anchor="ctr"/>
+          <a:lstStyle/>
+          <a:p>
+            <a:pPr>
+              <a:defRPr b="0" sz="2200">
+                <a:solidFill>
+                  <a:srgbClr val="FFFFFF"/>
+                </a:solidFill>
+                <a:latin typeface="+mn-lt"/>
+                <a:ea typeface="+mn-ea"/>
+                <a:cs typeface="+mn-cs"/>
+                <a:sym typeface="Helvetica Neue Medium"/>
+              </a:defRPr>
+            </a:pPr>
+          </a:p>
+        </p:txBody>
+      </p:sp>
+      <p:sp>
+        <p:nvSpPr>
+          <p:cNvPr id="161" name="Line"/>
+          <p:cNvSpPr/>
+          <p:nvPr/>
+        </p:nvSpPr>
+        <p:spPr>
+          <a:xfrm flipH="1">
+            <a:off x="3223548" y="6383869"/>
+            <a:ext cx="1689528" cy="131595"/>
+          </a:xfrm>
+          <a:prstGeom prst="line">
+            <a:avLst/>
+          </a:prstGeom>
+          <a:ln w="63500">
+            <a:solidFill>
+              <a:srgbClr val="000000"/>
+            </a:solidFill>
+            <a:miter lim="400000"/>
+            <a:tailEnd type="triangle"/>
+          </a:ln>
+        </p:spPr>
+        <p:txBody>
+          <a:bodyPr lIns="50800" tIns="50800" rIns="50800" bIns="50800" anchor="ctr"/>
+          <a:lstStyle/>
+          <a:p>
+            <a:pPr>
+              <a:defRPr b="0" sz="2200">
+                <a:solidFill>
+                  <a:srgbClr val="FFFFFF"/>
+                </a:solidFill>
+                <a:latin typeface="+mn-lt"/>
+                <a:ea typeface="+mn-ea"/>
+                <a:cs typeface="+mn-cs"/>
+                <a:sym typeface="Helvetica Neue Medium"/>
+              </a:defRPr>
+            </a:pPr>
+          </a:p>
+        </p:txBody>
+      </p:sp>
+      <p:sp>
+        <p:nvSpPr>
+          <p:cNvPr id="162" name="Line"/>
+          <p:cNvSpPr/>
+          <p:nvPr/>
+        </p:nvSpPr>
+        <p:spPr>
+          <a:xfrm flipH="1">
+            <a:off x="3346432" y="5618919"/>
+            <a:ext cx="1573301" cy="1"/>
+          </a:xfrm>
+          <a:prstGeom prst="line">
+            <a:avLst/>
+          </a:prstGeom>
+          <a:ln w="63500">
+            <a:solidFill>
+              <a:srgbClr val="000000"/>
+            </a:solidFill>
+            <a:miter lim="400000"/>
+            <a:tailEnd type="triangle"/>
+          </a:ln>
+        </p:spPr>
+        <p:txBody>
+          <a:bodyPr lIns="50800" tIns="50800" rIns="50800" bIns="50800" anchor="ctr"/>
+          <a:lstStyle/>
+          <a:p>
+            <a:pPr>
+              <a:defRPr b="0" sz="2200">
+                <a:solidFill>
+                  <a:srgbClr val="FFFFFF"/>
+                </a:solidFill>
+                <a:latin typeface="+mn-lt"/>
+                <a:ea typeface="+mn-ea"/>
+                <a:cs typeface="+mn-cs"/>
+                <a:sym typeface="Helvetica Neue Medium"/>
+              </a:defRPr>
+            </a:pPr>
+          </a:p>
+        </p:txBody>
+      </p:sp>
+      <p:sp>
+        <p:nvSpPr>
+          <p:cNvPr id="163" name="Line"/>
+          <p:cNvSpPr/>
+          <p:nvPr/>
+        </p:nvSpPr>
+        <p:spPr>
+          <a:xfrm flipV="1">
+            <a:off x="8400449" y="4209679"/>
+            <a:ext cx="1534123" cy="555657"/>
+          </a:xfrm>
+          <a:prstGeom prst="line">
+            <a:avLst/>
+          </a:prstGeom>
+          <a:ln w="63500">
+            <a:solidFill>
+              <a:srgbClr val="000000"/>
+            </a:solidFill>
+            <a:miter lim="400000"/>
+            <a:tailEnd type="triangle"/>
+          </a:ln>
+        </p:spPr>
+        <p:txBody>
+          <a:bodyPr lIns="50800" tIns="50800" rIns="50800" bIns="50800" anchor="ctr"/>
+          <a:lstStyle/>
+          <a:p>
+            <a:pPr>
+              <a:defRPr b="0" sz="2200">
+                <a:solidFill>
+                  <a:srgbClr val="FFFFFF"/>
+                </a:solidFill>
+                <a:latin typeface="+mn-lt"/>
+                <a:ea typeface="+mn-ea"/>
+                <a:cs typeface="+mn-cs"/>
+                <a:sym typeface="Helvetica Neue Medium"/>
+              </a:defRPr>
+            </a:pPr>
+          </a:p>
+        </p:txBody>
+      </p:sp>
+      <p:sp>
+        <p:nvSpPr>
+          <p:cNvPr id="164" name="Line"/>
+          <p:cNvSpPr/>
+          <p:nvPr/>
+        </p:nvSpPr>
+        <p:spPr>
+          <a:xfrm flipV="1">
+            <a:off x="8442289" y="5124079"/>
+            <a:ext cx="1447136" cy="352056"/>
+          </a:xfrm>
+          <a:prstGeom prst="line">
+            <a:avLst/>
+          </a:prstGeom>
+          <a:ln w="63500">
+            <a:solidFill>
+              <a:srgbClr val="000000"/>
+            </a:solidFill>
+            <a:miter lim="400000"/>
+            <a:tailEnd type="triangle"/>
+          </a:ln>
+        </p:spPr>
+        <p:txBody>
+          <a:bodyPr lIns="50800" tIns="50800" rIns="50800" bIns="50800" anchor="ctr"/>
+          <a:lstStyle/>
+          <a:p>
+            <a:pPr>
+              <a:defRPr b="0" sz="2200">
+                <a:solidFill>
+                  <a:srgbClr val="FFFFFF"/>
+                </a:solidFill>
+                <a:latin typeface="+mn-lt"/>
+                <a:ea typeface="+mn-ea"/>
+                <a:cs typeface="+mn-cs"/>
+                <a:sym typeface="Helvetica Neue Medium"/>
+              </a:defRPr>
+            </a:pPr>
+          </a:p>
+        </p:txBody>
+      </p:sp>
+      <p:sp>
+        <p:nvSpPr>
+          <p:cNvPr id="165" name="OCaml"/>
+          <p:cNvSpPr txBox="1"/>
+          <p:nvPr/>
+        </p:nvSpPr>
+        <p:spPr>
+          <a:xfrm>
+            <a:off x="2278583" y="5388390"/>
+            <a:ext cx="1107034" cy="461059"/>
+          </a:xfrm>
+          <a:prstGeom prst="rect">
+            <a:avLst/>
+          </a:prstGeom>
+          <a:ln w="12700">
+            <a:miter lim="400000"/>
+          </a:ln>
+          <a:extLst>
+            <a:ext uri="{C572A759-6A51-4108-AA02-DFA0A04FC94B}">
+              <ma14:wrappingTextBoxFlag xmlns:ma14="http://schemas.microsoft.com/office/mac/drawingml/2011/main" val="1"/>
+            </a:ext>
+          </a:extLst>
+        </p:spPr>
+        <p:txBody>
+          <a:bodyPr wrap="none" lIns="50800" tIns="50800" rIns="50800" bIns="50800" anchor="ctr">
+            <a:spAutoFit/>
+          </a:bodyPr>
+          <a:lstStyle/>
+          <a:p>
+            <a:pPr/>
+            <a:r>
+              <a:t>OCaml</a:t>
+            </a:r>
+          </a:p>
+        </p:txBody>
+      </p:sp>
+      <p:sp>
+        <p:nvSpPr>
+          <p:cNvPr id="166" name="Line"/>
+          <p:cNvSpPr/>
+          <p:nvPr/>
+        </p:nvSpPr>
+        <p:spPr>
+          <a:xfrm flipH="1">
+            <a:off x="1171571" y="5624493"/>
+            <a:ext cx="1111258" cy="1"/>
+          </a:xfrm>
+          <a:prstGeom prst="line">
+            <a:avLst/>
+          </a:prstGeom>
+          <a:ln w="63500">
+            <a:solidFill>
+              <a:srgbClr val="000000"/>
+            </a:solidFill>
+            <a:miter lim="400000"/>
+            <a:tailEnd type="triangle"/>
+          </a:ln>
+        </p:spPr>
+        <p:txBody>
+          <a:bodyPr lIns="50800" tIns="50800" rIns="50800" bIns="50800" anchor="ctr"/>
+          <a:lstStyle/>
+          <a:p>
+            <a:pPr>
+              <a:defRPr b="0" sz="2200">
+                <a:solidFill>
+                  <a:srgbClr val="FFFFFF"/>
+                </a:solidFill>
+                <a:latin typeface="+mn-lt"/>
+                <a:ea typeface="+mn-ea"/>
+                <a:cs typeface="+mn-cs"/>
+                <a:sym typeface="Helvetica Neue Medium"/>
+              </a:defRPr>
+            </a:pPr>
+          </a:p>
+        </p:txBody>
+      </p:sp>
+      <p:sp>
+        <p:nvSpPr>
+          <p:cNvPr id="167" name="C"/>
+          <p:cNvSpPr txBox="1"/>
+          <p:nvPr/>
+        </p:nvSpPr>
+        <p:spPr>
+          <a:xfrm>
+            <a:off x="782421" y="4519270"/>
+            <a:ext cx="340158" cy="461060"/>
+          </a:xfrm>
+          <a:prstGeom prst="rect">
+            <a:avLst/>
+          </a:prstGeom>
+          <a:ln w="12700">
+            <a:miter lim="400000"/>
+          </a:ln>
+          <a:extLst>
+            <a:ext uri="{C572A759-6A51-4108-AA02-DFA0A04FC94B}">
+              <ma14:wrappingTextBoxFlag xmlns:ma14="http://schemas.microsoft.com/office/mac/drawingml/2011/main" val="1"/>
+            </a:ext>
+          </a:extLst>
+        </p:spPr>
+        <p:txBody>
+          <a:bodyPr wrap="none" lIns="50800" tIns="50800" rIns="50800" bIns="50800" anchor="ctr">
+            <a:spAutoFit/>
+          </a:bodyPr>
+          <a:lstStyle/>
+          <a:p>
+            <a:pPr/>
+            <a:r>
+              <a:t>C</a:t>
+            </a:r>
+          </a:p>
+        </p:txBody>
+      </p:sp>
+      <p:sp>
+        <p:nvSpPr>
+          <p:cNvPr id="168" name="F#"/>
+          <p:cNvSpPr txBox="1"/>
+          <p:nvPr/>
+        </p:nvSpPr>
+        <p:spPr>
+          <a:xfrm>
+            <a:off x="2688742" y="6257509"/>
+            <a:ext cx="464516" cy="461060"/>
+          </a:xfrm>
+          <a:prstGeom prst="rect">
+            <a:avLst/>
+          </a:prstGeom>
+          <a:ln w="12700">
+            <a:miter lim="400000"/>
+          </a:ln>
+          <a:extLst>
+            <a:ext uri="{C572A759-6A51-4108-AA02-DFA0A04FC94B}">
+              <ma14:wrappingTextBoxFlag xmlns:ma14="http://schemas.microsoft.com/office/mac/drawingml/2011/main" val="1"/>
+            </a:ext>
+          </a:extLst>
+        </p:spPr>
+        <p:txBody>
+          <a:bodyPr wrap="none" lIns="50800" tIns="50800" rIns="50800" bIns="50800" anchor="ctr">
+            <a:spAutoFit/>
+          </a:bodyPr>
+          <a:lstStyle/>
+          <a:p>
+            <a:pPr/>
+            <a:r>
+              <a:t>F#</a:t>
+            </a:r>
+          </a:p>
+        </p:txBody>
+      </p:sp>
+      <p:sp>
+        <p:nvSpPr>
+          <p:cNvPr id="169" name="Line"/>
+          <p:cNvSpPr/>
+          <p:nvPr/>
+        </p:nvSpPr>
+        <p:spPr>
+          <a:xfrm flipH="1">
+            <a:off x="1438271" y="6500793"/>
+            <a:ext cx="1111258" cy="1"/>
+          </a:xfrm>
+          <a:prstGeom prst="line">
+            <a:avLst/>
+          </a:prstGeom>
+          <a:ln w="63500">
+            <a:solidFill>
+              <a:srgbClr val="000000"/>
+            </a:solidFill>
+            <a:miter lim="400000"/>
+            <a:tailEnd type="triangle"/>
+          </a:ln>
+        </p:spPr>
+        <p:txBody>
+          <a:bodyPr lIns="50800" tIns="50800" rIns="50800" bIns="50800" anchor="ctr"/>
+          <a:lstStyle/>
+          <a:p>
+            <a:pPr>
+              <a:defRPr b="0" sz="2200">
+                <a:solidFill>
+                  <a:srgbClr val="FFFFFF"/>
+                </a:solidFill>
+                <a:latin typeface="+mn-lt"/>
+                <a:ea typeface="+mn-ea"/>
+                <a:cs typeface="+mn-cs"/>
+                <a:sym typeface="Helvetica Neue Medium"/>
+              </a:defRPr>
+            </a:pPr>
+          </a:p>
+        </p:txBody>
+      </p:sp>
+      <p:sp>
+        <p:nvSpPr>
+          <p:cNvPr id="170" name=".net"/>
+          <p:cNvSpPr txBox="1"/>
+          <p:nvPr/>
+        </p:nvSpPr>
+        <p:spPr>
+          <a:xfrm>
+            <a:off x="727252" y="6277075"/>
+            <a:ext cx="662027" cy="461059"/>
+          </a:xfrm>
+          <a:prstGeom prst="rect">
+            <a:avLst/>
+          </a:prstGeom>
+          <a:ln w="12700">
+            <a:miter lim="400000"/>
+          </a:ln>
+          <a:extLst>
+            <a:ext uri="{C572A759-6A51-4108-AA02-DFA0A04FC94B}">
+              <ma14:wrappingTextBoxFlag xmlns:ma14="http://schemas.microsoft.com/office/mac/drawingml/2011/main" val="1"/>
+            </a:ext>
+          </a:extLst>
+        </p:spPr>
+        <p:txBody>
+          <a:bodyPr wrap="none" lIns="50800" tIns="50800" rIns="50800" bIns="50800" anchor="ctr">
+            <a:spAutoFit/>
+          </a:bodyPr>
+          <a:lstStyle/>
+          <a:p>
+            <a:pPr/>
+            <a:r>
+              <a:t>.net</a:t>
+            </a:r>
+          </a:p>
+        </p:txBody>
+      </p:sp>
+      <p:sp>
+        <p:nvSpPr>
+          <p:cNvPr id="171" name="Haskell"/>
+          <p:cNvSpPr txBox="1"/>
+          <p:nvPr/>
+        </p:nvSpPr>
+        <p:spPr>
+          <a:xfrm>
+            <a:off x="1735520" y="7382290"/>
+            <a:ext cx="1185977" cy="461059"/>
+          </a:xfrm>
+          <a:prstGeom prst="rect">
+            <a:avLst/>
+          </a:prstGeom>
+          <a:ln w="12700">
+            <a:miter lim="400000"/>
+          </a:ln>
+          <a:extLst>
+            <a:ext uri="{C572A759-6A51-4108-AA02-DFA0A04FC94B}">
+              <ma14:wrappingTextBoxFlag xmlns:ma14="http://schemas.microsoft.com/office/mac/drawingml/2011/main" val="1"/>
+            </a:ext>
+          </a:extLst>
+        </p:spPr>
+        <p:txBody>
+          <a:bodyPr wrap="none" lIns="50800" tIns="50800" rIns="50800" bIns="50800" anchor="ctr">
+            <a:spAutoFit/>
+          </a:bodyPr>
+          <a:lstStyle/>
+          <a:p>
+            <a:pPr/>
+            <a:r>
+              <a:t>Haskell</a:t>
+            </a:r>
+          </a:p>
+        </p:txBody>
+      </p:sp>
+      <p:sp>
+        <p:nvSpPr>
+          <p:cNvPr id="172" name="Line"/>
+          <p:cNvSpPr/>
+          <p:nvPr/>
+        </p:nvSpPr>
+        <p:spPr>
+          <a:xfrm flipH="1">
+            <a:off x="3198219" y="7676679"/>
+            <a:ext cx="1719265" cy="682392"/>
+          </a:xfrm>
+          <a:prstGeom prst="line">
+            <a:avLst/>
+          </a:prstGeom>
+          <a:ln w="63500">
+            <a:solidFill>
+              <a:srgbClr val="000000"/>
+            </a:solidFill>
+            <a:miter lim="400000"/>
+            <a:tailEnd type="triangle"/>
+          </a:ln>
+        </p:spPr>
+        <p:txBody>
+          <a:bodyPr lIns="50800" tIns="50800" rIns="50800" bIns="50800" anchor="ctr"/>
+          <a:lstStyle/>
+          <a:p>
+            <a:pPr>
+              <a:defRPr b="0" sz="2200">
+                <a:solidFill>
+                  <a:srgbClr val="FFFFFF"/>
+                </a:solidFill>
+                <a:latin typeface="+mn-lt"/>
+                <a:ea typeface="+mn-ea"/>
+                <a:cs typeface="+mn-cs"/>
+                <a:sym typeface="Helvetica Neue Medium"/>
+              </a:defRPr>
+            </a:pPr>
+          </a:p>
+        </p:txBody>
+      </p:sp>
+      <p:sp>
+        <p:nvSpPr>
+          <p:cNvPr id="173" name="Scala"/>
+          <p:cNvSpPr txBox="1"/>
+          <p:nvPr/>
+        </p:nvSpPr>
+        <p:spPr>
+          <a:xfrm>
+            <a:off x="2064359" y="8129058"/>
+            <a:ext cx="915620" cy="461059"/>
+          </a:xfrm>
+          <a:prstGeom prst="rect">
+            <a:avLst/>
+          </a:prstGeom>
+          <a:ln w="12700">
+            <a:miter lim="400000"/>
+          </a:ln>
+          <a:extLst>
+            <a:ext uri="{C572A759-6A51-4108-AA02-DFA0A04FC94B}">
+              <ma14:wrappingTextBoxFlag xmlns:ma14="http://schemas.microsoft.com/office/mac/drawingml/2011/main" val="1"/>
+            </a:ext>
+          </a:extLst>
+        </p:spPr>
+        <p:txBody>
+          <a:bodyPr wrap="none" lIns="50800" tIns="50800" rIns="50800" bIns="50800" anchor="ctr">
+            <a:spAutoFit/>
+          </a:bodyPr>
+          <a:lstStyle/>
+          <a:p>
+            <a:pPr/>
+            <a:r>
+              <a:t>Scala</a:t>
+            </a:r>
+          </a:p>
+        </p:txBody>
+      </p:sp>
+      <p:sp>
+        <p:nvSpPr>
+          <p:cNvPr id="174" name="LaTeX"/>
+          <p:cNvSpPr txBox="1"/>
+          <p:nvPr/>
+        </p:nvSpPr>
+        <p:spPr>
+          <a:xfrm>
+            <a:off x="9964470" y="4011270"/>
+            <a:ext cx="1000660" cy="461060"/>
+          </a:xfrm>
+          <a:prstGeom prst="rect">
+            <a:avLst/>
+          </a:prstGeom>
+          <a:ln w="12700">
+            <a:miter lim="400000"/>
+          </a:ln>
+          <a:extLst>
+            <a:ext uri="{C572A759-6A51-4108-AA02-DFA0A04FC94B}">
+              <ma14:wrappingTextBoxFlag xmlns:ma14="http://schemas.microsoft.com/office/mac/drawingml/2011/main" val="1"/>
+            </a:ext>
+          </a:extLst>
+        </p:spPr>
+        <p:txBody>
+          <a:bodyPr wrap="none" lIns="50800" tIns="50800" rIns="50800" bIns="50800" anchor="ctr">
+            <a:spAutoFit/>
+          </a:bodyPr>
+          <a:lstStyle/>
+          <a:p>
+            <a:pPr/>
+            <a:r>
+              <a:t>LaTeX</a:t>
+            </a:r>
+          </a:p>
+        </p:txBody>
+      </p:sp>
+      <p:sp>
+        <p:nvSpPr>
+          <p:cNvPr id="175" name="Line"/>
+          <p:cNvSpPr/>
+          <p:nvPr/>
+        </p:nvSpPr>
+        <p:spPr>
+          <a:xfrm>
+            <a:off x="11014571" y="4241800"/>
+            <a:ext cx="915621" cy="0"/>
+          </a:xfrm>
+          <a:prstGeom prst="line">
+            <a:avLst/>
+          </a:prstGeom>
+          <a:ln w="63500">
+            <a:solidFill>
+              <a:srgbClr val="000000"/>
+            </a:solidFill>
+            <a:miter lim="400000"/>
+            <a:tailEnd type="triangle"/>
+          </a:ln>
+        </p:spPr>
+        <p:txBody>
+          <a:bodyPr lIns="50800" tIns="50800" rIns="50800" bIns="50800" anchor="ctr"/>
+          <a:lstStyle/>
+          <a:p>
+            <a:pPr>
+              <a:defRPr b="0" sz="2200">
+                <a:solidFill>
+                  <a:srgbClr val="FFFFFF"/>
+                </a:solidFill>
+                <a:latin typeface="+mn-lt"/>
+                <a:ea typeface="+mn-ea"/>
+                <a:cs typeface="+mn-cs"/>
+                <a:sym typeface="Helvetica Neue Medium"/>
+              </a:defRPr>
+            </a:pPr>
+          </a:p>
+        </p:txBody>
+      </p:sp>
+      <p:sp>
+        <p:nvSpPr>
+          <p:cNvPr id="176" name="pdf"/>
+          <p:cNvSpPr txBox="1"/>
+          <p:nvPr/>
+        </p:nvSpPr>
+        <p:spPr>
+          <a:xfrm>
+            <a:off x="12070159" y="4011270"/>
+            <a:ext cx="588265" cy="461060"/>
+          </a:xfrm>
+          <a:prstGeom prst="rect">
+            <a:avLst/>
+          </a:prstGeom>
+          <a:ln w="12700">
+            <a:miter lim="400000"/>
+          </a:ln>
+          <a:extLst>
+            <a:ext uri="{C572A759-6A51-4108-AA02-DFA0A04FC94B}">
+              <ma14:wrappingTextBoxFlag xmlns:ma14="http://schemas.microsoft.com/office/mac/drawingml/2011/main" val="1"/>
+            </a:ext>
+          </a:extLst>
+        </p:spPr>
+        <p:txBody>
+          <a:bodyPr wrap="none" lIns="50800" tIns="50800" rIns="50800" bIns="50800" anchor="ctr">
+            <a:spAutoFit/>
+          </a:bodyPr>
+          <a:lstStyle/>
+          <a:p>
+            <a:pPr/>
+            <a:r>
+              <a:t>pdf</a:t>
+            </a:r>
+          </a:p>
+        </p:txBody>
+      </p:sp>
+      <p:sp>
+        <p:nvSpPr>
+          <p:cNvPr id="177" name="HTML"/>
+          <p:cNvSpPr txBox="1"/>
+          <p:nvPr/>
+        </p:nvSpPr>
+        <p:spPr>
+          <a:xfrm>
+            <a:off x="9973005" y="4900270"/>
+            <a:ext cx="983590" cy="461060"/>
+          </a:xfrm>
+          <a:prstGeom prst="rect">
+            <a:avLst/>
+          </a:prstGeom>
+          <a:ln w="12700">
+            <a:miter lim="400000"/>
+          </a:ln>
+          <a:extLst>
+            <a:ext uri="{C572A759-6A51-4108-AA02-DFA0A04FC94B}">
+              <ma14:wrappingTextBoxFlag xmlns:ma14="http://schemas.microsoft.com/office/mac/drawingml/2011/main" val="1"/>
+            </a:ext>
+          </a:extLst>
+        </p:spPr>
+        <p:txBody>
+          <a:bodyPr wrap="none" lIns="50800" tIns="50800" rIns="50800" bIns="50800" anchor="ctr">
+            <a:spAutoFit/>
+          </a:bodyPr>
+          <a:lstStyle/>
+          <a:p>
+            <a:pPr/>
+            <a:r>
+              <a:t>HTML</a:t>
+            </a:r>
+          </a:p>
+        </p:txBody>
+      </p:sp>
+      <p:sp>
+        <p:nvSpPr>
+          <p:cNvPr id="178" name="Line"/>
+          <p:cNvSpPr/>
+          <p:nvPr/>
+        </p:nvSpPr>
+        <p:spPr>
+          <a:xfrm>
+            <a:off x="8442289" y="7538726"/>
+            <a:ext cx="1439631" cy="1"/>
+          </a:xfrm>
+          <a:prstGeom prst="line">
+            <a:avLst/>
+          </a:prstGeom>
+          <a:ln w="63500">
+            <a:solidFill>
+              <a:srgbClr val="000000"/>
+            </a:solidFill>
+            <a:miter lim="400000"/>
+            <a:tailEnd type="triangle"/>
+          </a:ln>
+        </p:spPr>
+        <p:txBody>
+          <a:bodyPr lIns="50800" tIns="50800" rIns="50800" bIns="50800" anchor="ctr"/>
+          <a:lstStyle/>
+          <a:p>
+            <a:pPr>
+              <a:defRPr b="0" sz="2200">
+                <a:solidFill>
+                  <a:srgbClr val="FFFFFF"/>
+                </a:solidFill>
+                <a:latin typeface="+mn-lt"/>
+                <a:ea typeface="+mn-ea"/>
+                <a:cs typeface="+mn-cs"/>
+                <a:sym typeface="Helvetica Neue Medium"/>
+              </a:defRPr>
+            </a:pPr>
+          </a:p>
+        </p:txBody>
+      </p:sp>
+      <p:sp>
+        <p:nvSpPr>
+          <p:cNvPr id="179" name="SMTLIB2"/>
+          <p:cNvSpPr txBox="1"/>
+          <p:nvPr/>
+        </p:nvSpPr>
+        <p:spPr>
+          <a:xfrm>
+            <a:off x="10004044" y="7308196"/>
+            <a:ext cx="1429513" cy="461060"/>
+          </a:xfrm>
+          <a:prstGeom prst="rect">
+            <a:avLst/>
+          </a:prstGeom>
+          <a:ln w="12700">
+            <a:miter lim="400000"/>
+          </a:ln>
+          <a:extLst>
+            <a:ext uri="{C572A759-6A51-4108-AA02-DFA0A04FC94B}">
+              <ma14:wrappingTextBoxFlag xmlns:ma14="http://schemas.microsoft.com/office/mac/drawingml/2011/main" val="1"/>
+            </a:ext>
+          </a:extLst>
+        </p:spPr>
+        <p:txBody>
+          <a:bodyPr wrap="none" lIns="50800" tIns="50800" rIns="50800" bIns="50800" anchor="ctr">
+            <a:spAutoFit/>
+          </a:bodyPr>
+          <a:lstStyle/>
+          <a:p>
+            <a:pPr/>
+            <a:r>
+              <a:t>SMTLIB2</a:t>
+            </a:r>
+          </a:p>
+        </p:txBody>
+      </p:sp>
+    </p:spTree>
+  </p:cSld>
+  <p:clrMapOvr>
+    <a:masterClrMapping/>
+  </p:clrMapOvr>
+  <p:transition xmlns:p14="http://schemas.microsoft.com/office/powerpoint/2010/main" spd="med" advClick="1"/>
+</p:sld>
+</file>
+
+<file path=ppt/slides/slide2.xml><?xml version="1.0" encoding="utf-8"?>
+<p:sld xmlns:a="http://schemas.openxmlformats.org/drawingml/2006/main" xmlns:r="http://schemas.openxmlformats.org/officeDocument/2006/relationships" xmlns:p="http://schemas.openxmlformats.org/presentationml/2006/main" xmlns:m="http://schemas.openxmlformats.org/officeDocument/2006/math" xmlns:a14="http://schemas.microsoft.com/office/drawing/2010/main" showMasterSp="1" showMasterPhAnim="1">
+  <p:cSld>
+    <p:spTree>
+      <p:nvGrpSpPr>
+        <p:cNvPr id="1" name=""/>
+        <p:cNvGrpSpPr/>
+        <p:nvPr/>
+      </p:nvGrpSpPr>
+      <p:grpSpPr>
+        <a:xfrm>
+          <a:off x="0" y="0"/>
+          <a:ext cx="0" cy="0"/>
+          <a:chOff x="0" y="0"/>
+          <a:chExt cx="0" cy="0"/>
+        </a:xfrm>
+      </p:grpSpPr>
+      <p:sp>
+        <p:nvSpPr>
+          <p:cNvPr id="181" name="Rectangle"/>
+          <p:cNvSpPr/>
+          <p:nvPr/>
+        </p:nvSpPr>
+        <p:spPr>
+          <a:xfrm>
+            <a:off x="5969000" y="104921"/>
+            <a:ext cx="2499817" cy="3017159"/>
+          </a:xfrm>
+          <a:prstGeom prst="rect">
+            <a:avLst/>
+          </a:prstGeom>
+          <a:solidFill>
+            <a:srgbClr val="D7D500">
+              <a:alpha val="58350"/>
+            </a:srgbClr>
+          </a:solidFill>
+          <a:ln w="63500">
+            <a:solidFill>
+              <a:srgbClr val="000000"/>
+            </a:solidFill>
+            <a:miter lim="400000"/>
+          </a:ln>
+        </p:spPr>
+        <p:txBody>
+          <a:bodyPr lIns="50800" tIns="50800" rIns="50800" bIns="50800" anchor="ctr"/>
+          <a:lstStyle/>
+          <a:p>
+            <a:pPr>
+              <a:defRPr b="0" sz="2200">
+                <a:solidFill>
+                  <a:srgbClr val="FFFFFF"/>
+                </a:solidFill>
+                <a:latin typeface="+mn-lt"/>
+                <a:ea typeface="+mn-ea"/>
+                <a:cs typeface="+mn-cs"/>
+                <a:sym typeface="Helvetica Neue Medium"/>
+              </a:defRPr>
+            </a:pPr>
+          </a:p>
+        </p:txBody>
+      </p:sp>
+      <p:sp>
+        <p:nvSpPr>
+          <p:cNvPr id="182" name="A"/>
+          <p:cNvSpPr txBox="1"/>
+          <p:nvPr/>
+        </p:nvSpPr>
+        <p:spPr>
+          <a:xfrm>
+            <a:off x="6074155" y="328270"/>
+            <a:ext cx="323089" cy="461060"/>
+          </a:xfrm>
+          <a:prstGeom prst="rect">
+            <a:avLst/>
+          </a:prstGeom>
+          <a:ln w="12700">
+            <a:miter lim="400000"/>
+          </a:ln>
+          <a:extLst>
+            <a:ext uri="{C572A759-6A51-4108-AA02-DFA0A04FC94B}">
+              <ma14:wrappingTextBoxFlag xmlns:ma14="http://schemas.microsoft.com/office/mac/drawingml/2011/main" val="1"/>
+            </a:ext>
+          </a:extLst>
+        </p:spPr>
+        <p:txBody>
+          <a:bodyPr wrap="none" lIns="50800" tIns="50800" rIns="50800" bIns="50800" anchor="ctr">
+            <a:spAutoFit/>
+          </a:bodyPr>
+          <a:lstStyle/>
+          <a:p>
+            <a:pPr/>
+            <a:r>
               <a:t>A</a:t>
             </a:r>
           </a:p>
@@ -3009,7 +5967,7 @@
       </p:sp>
       <p:sp>
         <p:nvSpPr>
-          <p:cNvPr id="121" name="header"/>
+          <p:cNvPr id="183" name="header"/>
           <p:cNvSpPr/>
           <p:nvPr/>
         </p:nvSpPr>
@@ -3060,7 +6018,7 @@
       </p:sp>
       <p:sp>
         <p:nvSpPr>
-          <p:cNvPr id="122" name="context…"/>
+          <p:cNvPr id="184" name="context…"/>
           <p:cNvSpPr/>
           <p:nvPr/>
         </p:nvSpPr>
@@ -3125,7 +6083,7 @@
       </p:sp>
       <p:sp>
         <p:nvSpPr>
-          <p:cNvPr id="123" name="command"/>
+          <p:cNvPr id="185" name="command"/>
           <p:cNvSpPr/>
           <p:nvPr/>
         </p:nvSpPr>
@@ -3176,7 +6134,7 @@
       </p:sp>
       <p:sp>
         <p:nvSpPr>
-          <p:cNvPr id="124" name="command"/>
+          <p:cNvPr id="186" name="command"/>
           <p:cNvSpPr/>
           <p:nvPr/>
         </p:nvSpPr>
@@ -3227,7 +6185,7 @@
       </p:sp>
       <p:sp>
         <p:nvSpPr>
-          <p:cNvPr id="125" name="command"/>
+          <p:cNvPr id="187" name="command"/>
           <p:cNvSpPr/>
           <p:nvPr/>
         </p:nvSpPr>
@@ -3278,7 +6236,7 @@
       </p:sp>
       <p:sp>
         <p:nvSpPr>
-          <p:cNvPr id="126" name="command"/>
+          <p:cNvPr id="188" name="command"/>
           <p:cNvSpPr/>
           <p:nvPr/>
         </p:nvSpPr>
@@ -3329,7 +6287,7 @@
       </p:sp>
       <p:sp>
         <p:nvSpPr>
-          <p:cNvPr id="127" name="Rectangle"/>
+          <p:cNvPr id="189" name="Rectangle"/>
           <p:cNvSpPr/>
           <p:nvPr/>
         </p:nvSpPr>
@@ -3373,7 +6331,7 @@
       </p:sp>
       <p:sp>
         <p:nvSpPr>
-          <p:cNvPr id="128" name="B"/>
+          <p:cNvPr id="190" name="B"/>
           <p:cNvSpPr txBox="1"/>
           <p:nvPr/>
         </p:nvSpPr>
@@ -3409,7 +6367,7 @@
       </p:sp>
       <p:sp>
         <p:nvSpPr>
-          <p:cNvPr id="129" name="header"/>
+          <p:cNvPr id="191" name="header"/>
           <p:cNvSpPr/>
           <p:nvPr/>
         </p:nvSpPr>
@@ -3460,7 +6418,7 @@
       </p:sp>
       <p:sp>
         <p:nvSpPr>
-          <p:cNvPr id="130" name="context definition"/>
+          <p:cNvPr id="192" name="context definition"/>
           <p:cNvSpPr/>
           <p:nvPr/>
         </p:nvSpPr>
@@ -3669,7 +6627,7 @@
       </p:sp>
       <p:sp>
         <p:nvSpPr>
-          <p:cNvPr id="131" name="command"/>
+          <p:cNvPr id="193" name="command"/>
           <p:cNvSpPr/>
           <p:nvPr/>
         </p:nvSpPr>
@@ -3720,7 +6678,7 @@
       </p:sp>
       <p:sp>
         <p:nvSpPr>
-          <p:cNvPr id="132" name="command"/>
+          <p:cNvPr id="194" name="command"/>
           <p:cNvSpPr/>
           <p:nvPr/>
         </p:nvSpPr>
@@ -3771,7 +6729,7 @@
       </p:sp>
       <p:sp>
         <p:nvSpPr>
-          <p:cNvPr id="133" name="command"/>
+          <p:cNvPr id="195" name="command"/>
           <p:cNvSpPr/>
           <p:nvPr/>
         </p:nvSpPr>
@@ -3822,7 +6780,7 @@
       </p:sp>
       <p:sp>
         <p:nvSpPr>
-          <p:cNvPr id="134" name="Rectangle"/>
+          <p:cNvPr id="196" name="Rectangle"/>
           <p:cNvSpPr/>
           <p:nvPr/>
         </p:nvSpPr>
@@ -3866,7 +6824,7 @@
       </p:sp>
       <p:sp>
         <p:nvSpPr>
-          <p:cNvPr id="135" name="C"/>
+          <p:cNvPr id="197" name="C"/>
           <p:cNvSpPr txBox="1"/>
           <p:nvPr/>
         </p:nvSpPr>
@@ -3902,7 +6860,7 @@
       </p:sp>
       <p:sp>
         <p:nvSpPr>
-          <p:cNvPr id="136" name="header"/>
+          <p:cNvPr id="198" name="header"/>
           <p:cNvSpPr/>
           <p:nvPr/>
         </p:nvSpPr>
@@ -3953,7 +6911,7 @@
       </p:sp>
       <p:sp>
         <p:nvSpPr>
-          <p:cNvPr id="137" name="context…"/>
+          <p:cNvPr id="199" name="context…"/>
           <p:cNvSpPr/>
           <p:nvPr/>
         </p:nvSpPr>
@@ -4018,7 +6976,7 @@
       </p:sp>
       <p:sp>
         <p:nvSpPr>
-          <p:cNvPr id="138" name="command"/>
+          <p:cNvPr id="200" name="command"/>
           <p:cNvSpPr/>
           <p:nvPr/>
         </p:nvSpPr>
@@ -4069,7 +7027,7 @@
       </p:sp>
       <p:sp>
         <p:nvSpPr>
-          <p:cNvPr id="139" name="command"/>
+          <p:cNvPr id="201" name="command"/>
           <p:cNvSpPr/>
           <p:nvPr/>
         </p:nvSpPr>
@@ -4120,7 +7078,7 @@
       </p:sp>
       <p:sp>
         <p:nvSpPr>
-          <p:cNvPr id="140" name="command"/>
+          <p:cNvPr id="202" name="command"/>
           <p:cNvSpPr/>
           <p:nvPr/>
         </p:nvSpPr>
@@ -4171,7 +7129,7 @@
       </p:sp>
       <p:sp>
         <p:nvSpPr>
-          <p:cNvPr id="141" name="command"/>
+          <p:cNvPr id="203" name="command"/>
           <p:cNvSpPr/>
           <p:nvPr/>
         </p:nvSpPr>
@@ -4222,7 +7180,7 @@
       </p:sp>
       <p:sp>
         <p:nvSpPr>
-          <p:cNvPr id="142" name="Rectangle"/>
+          <p:cNvPr id="204" name="Rectangle"/>
           <p:cNvSpPr/>
           <p:nvPr/>
         </p:nvSpPr>
@@ -4266,7 +7224,7 @@
       </p:sp>
       <p:sp>
         <p:nvSpPr>
-          <p:cNvPr id="143" name="D"/>
+          <p:cNvPr id="205" name="D"/>
           <p:cNvSpPr txBox="1"/>
           <p:nvPr/>
         </p:nvSpPr>
@@ -4302,7 +7260,7 @@
       </p:sp>
       <p:sp>
         <p:nvSpPr>
-          <p:cNvPr id="144" name="header"/>
+          <p:cNvPr id="206" name="header"/>
           <p:cNvSpPr/>
           <p:nvPr/>
         </p:nvSpPr>
@@ -4353,7 +7311,7 @@
       </p:sp>
       <p:sp>
         <p:nvSpPr>
-          <p:cNvPr id="145" name="context…"/>
+          <p:cNvPr id="207" name="context…"/>
           <p:cNvSpPr/>
           <p:nvPr/>
         </p:nvSpPr>
@@ -4418,7 +7376,7 @@
       </p:sp>
       <p:sp>
         <p:nvSpPr>
-          <p:cNvPr id="146" name="command"/>
+          <p:cNvPr id="208" name="command"/>
           <p:cNvSpPr/>
           <p:nvPr/>
         </p:nvSpPr>
@@ -4469,7 +7427,7 @@
       </p:sp>
       <p:sp>
         <p:nvSpPr>
-          <p:cNvPr id="147" name="command"/>
+          <p:cNvPr id="209" name="command"/>
           <p:cNvSpPr/>
           <p:nvPr/>
         </p:nvSpPr>
@@ -4520,10 +7478,10 @@
       </p:sp>
       <p:cxnSp>
         <p:nvCxnSpPr>
-          <p:cNvPr id="148" name="Connection Line"/>
+          <p:cNvPr id="210" name="Connection Line"/>
           <p:cNvCxnSpPr>
-            <a:stCxn id="127" idx="0"/>
-            <a:endCxn id="130" idx="0"/>
+            <a:stCxn id="189" idx="0"/>
+            <a:endCxn id="192" idx="0"/>
           </p:cNvCxnSpPr>
           <p:nvPr/>
         </p:nvCxnSpPr>
@@ -4545,10 +7503,10 @@
       </p:cxnSp>
       <p:cxnSp>
         <p:nvCxnSpPr>
-          <p:cNvPr id="149" name="Connection Line"/>
+          <p:cNvPr id="211" name="Connection Line"/>
           <p:cNvCxnSpPr>
-            <a:stCxn id="130" idx="0"/>
-            <a:endCxn id="119" idx="0"/>
+            <a:stCxn id="192" idx="0"/>
+            <a:endCxn id="181" idx="0"/>
           </p:cNvCxnSpPr>
           <p:nvPr/>
         </p:nvCxnSpPr>
@@ -4571,10 +7529,10 @@
       </p:cxnSp>
       <p:cxnSp>
         <p:nvCxnSpPr>
-          <p:cNvPr id="150" name="Connection Line"/>
+          <p:cNvPr id="212" name="Connection Line"/>
           <p:cNvCxnSpPr>
-            <a:stCxn id="119" idx="0"/>
-            <a:endCxn id="137" idx="0"/>
+            <a:stCxn id="181" idx="0"/>
+            <a:endCxn id="199" idx="0"/>
           </p:cNvCxnSpPr>
           <p:nvPr/>
         </p:nvCxnSpPr>
@@ -4597,10 +7555,10 @@
       </p:cxnSp>
       <p:cxnSp>
         <p:nvCxnSpPr>
-          <p:cNvPr id="151" name="Connection Line"/>
+          <p:cNvPr id="213" name="Connection Line"/>
           <p:cNvCxnSpPr>
-            <a:stCxn id="127" idx="0"/>
-            <a:endCxn id="145" idx="0"/>
+            <a:stCxn id="189" idx="0"/>
+            <a:endCxn id="207" idx="0"/>
           </p:cNvCxnSpPr>
           <p:nvPr/>
         </p:nvCxnSpPr>
@@ -4623,10 +7581,10 @@
       </p:cxnSp>
       <p:cxnSp>
         <p:nvCxnSpPr>
-          <p:cNvPr id="152" name="Connection Line"/>
+          <p:cNvPr id="214" name="Connection Line"/>
           <p:cNvCxnSpPr>
-            <a:stCxn id="134" idx="0"/>
-            <a:endCxn id="145" idx="0"/>
+            <a:stCxn id="196" idx="0"/>
+            <a:endCxn id="207" idx="0"/>
           </p:cNvCxnSpPr>
           <p:nvPr/>
         </p:nvCxnSpPr>
@@ -4647,6 +7605,46 @@
           </a:ln>
         </p:spPr>
       </p:cxnSp>
+      <p:sp>
+        <p:nvSpPr>
+          <p:cNvPr id="215" name="A Generic Document Model"/>
+          <p:cNvSpPr txBox="1"/>
+          <p:nvPr/>
+        </p:nvSpPr>
+        <p:spPr>
+          <a:xfrm>
+            <a:off x="-289146" y="592316"/>
+            <a:ext cx="6445692" cy="829360"/>
+          </a:xfrm>
+          <a:prstGeom prst="rect">
+            <a:avLst/>
+          </a:prstGeom>
+          <a:ln w="12700">
+            <a:miter lim="400000"/>
+          </a:ln>
+          <a:extLst>
+            <a:ext uri="{C572A759-6A51-4108-AA02-DFA0A04FC94B}">
+              <ma14:wrappingTextBoxFlag xmlns:ma14="http://schemas.microsoft.com/office/mac/drawingml/2011/main" val="1"/>
+            </a:ext>
+          </a:extLst>
+        </p:spPr>
+        <p:txBody>
+          <a:bodyPr lIns="50800" tIns="50800" rIns="50800" bIns="50800" anchor="ctr">
+            <a:spAutoFit/>
+          </a:bodyPr>
+          <a:lstStyle/>
+          <a:p>
+            <a:pPr/>
+            <a:r>
+              <a:t>A Generic</a:t>
+            </a:r>
+            <a:br/>
+            <a:r>
+              <a:t>Document Model</a:t>
+            </a:r>
+          </a:p>
+        </p:txBody>
+      </p:sp>
     </p:spTree>
   </p:cSld>
   <p:clrMapOvr>
@@ -4656,7 +7654,7 @@
 </p:sld>
 </file>
 
-<file path=ppt/slides/slide2.xml><?xml version="1.0" encoding="utf-8"?>
+<file path=ppt/slides/slide3.xml><?xml version="1.0" encoding="utf-8"?>
 <p:sld xmlns:a="http://schemas.openxmlformats.org/drawingml/2006/main" xmlns:r="http://schemas.openxmlformats.org/officeDocument/2006/relationships" xmlns:p="http://schemas.openxmlformats.org/presentationml/2006/main" xmlns:m="http://schemas.openxmlformats.org/officeDocument/2006/math" xmlns:a14="http://schemas.microsoft.com/office/drawing/2010/main" showMasterSp="1" showMasterPhAnim="1">
   <p:cSld>
     <p:spTree>
@@ -4675,7 +7673,7 @@
       </p:grpSpPr>
       <p:sp>
         <p:nvSpPr>
-          <p:cNvPr id="154" name="Rectangle"/>
+          <p:cNvPr id="217" name="Rectangle"/>
           <p:cNvSpPr/>
           <p:nvPr/>
         </p:nvSpPr>
@@ -4719,7 +7717,7 @@
       </p:sp>
       <p:sp>
         <p:nvSpPr>
-          <p:cNvPr id="155" name="A"/>
+          <p:cNvPr id="218" name="A"/>
           <p:cNvSpPr txBox="1"/>
           <p:nvPr/>
         </p:nvSpPr>
@@ -4755,7 +7753,7 @@
       </p:sp>
       <p:sp>
         <p:nvSpPr>
-          <p:cNvPr id="156" name="header"/>
+          <p:cNvPr id="219" name="header"/>
           <p:cNvSpPr/>
           <p:nvPr/>
         </p:nvSpPr>
@@ -4806,7 +7804,7 @@
       </p:sp>
       <p:sp>
         <p:nvSpPr>
-          <p:cNvPr id="157" name="context…"/>
+          <p:cNvPr id="220" name="context…"/>
           <p:cNvSpPr/>
           <p:nvPr/>
         </p:nvSpPr>
@@ -4871,7 +7869,7 @@
       </p:sp>
       <p:sp>
         <p:nvSpPr>
-          <p:cNvPr id="158" name="text‹ … ›"/>
+          <p:cNvPr id="221" name="text‹ … ›"/>
           <p:cNvSpPr/>
           <p:nvPr/>
         </p:nvSpPr>
@@ -4922,7 +7920,7 @@
       </p:sp>
       <p:sp>
         <p:nvSpPr>
-          <p:cNvPr id="159" name="definition‹ … ›"/>
+          <p:cNvPr id="222" name="definition‹ … ›"/>
           <p:cNvSpPr/>
           <p:nvPr/>
         </p:nvSpPr>
@@ -4976,7 +7974,7 @@
       </p:sp>
       <p:sp>
         <p:nvSpPr>
-          <p:cNvPr id="160" name="value‹ … ›"/>
+          <p:cNvPr id="223" name="value‹ … ›"/>
           <p:cNvSpPr/>
           <p:nvPr/>
         </p:nvSpPr>
@@ -5027,7 +8025,7 @@
       </p:sp>
       <p:sp>
         <p:nvSpPr>
-          <p:cNvPr id="161" name="lemma …"/>
+          <p:cNvPr id="224" name="lemma …"/>
           <p:cNvSpPr/>
           <p:nvPr/>
         </p:nvSpPr>
@@ -5078,7 +8076,7 @@
       </p:sp>
       <p:sp>
         <p:nvSpPr>
-          <p:cNvPr id="162" name="Rectangle"/>
+          <p:cNvPr id="225" name="Rectangle"/>
           <p:cNvSpPr/>
           <p:nvPr/>
         </p:nvSpPr>
@@ -5122,7 +8120,7 @@
       </p:sp>
       <p:sp>
         <p:nvSpPr>
-          <p:cNvPr id="163" name="B"/>
+          <p:cNvPr id="226" name="B"/>
           <p:cNvSpPr txBox="1"/>
           <p:nvPr/>
         </p:nvSpPr>
@@ -5158,7 +8156,7 @@
       </p:sp>
       <p:sp>
         <p:nvSpPr>
-          <p:cNvPr id="164" name="header"/>
+          <p:cNvPr id="227" name="header"/>
           <p:cNvSpPr/>
           <p:nvPr/>
         </p:nvSpPr>
@@ -5209,7 +8207,7 @@
       </p:sp>
       <p:sp>
         <p:nvSpPr>
-          <p:cNvPr id="165" name="context definition"/>
+          <p:cNvPr id="228" name="context definition"/>
           <p:cNvSpPr/>
           <p:nvPr/>
         </p:nvSpPr>
@@ -5418,7 +8416,7 @@
       </p:sp>
       <p:sp>
         <p:nvSpPr>
-          <p:cNvPr id="166" name="ML‹ … ›"/>
+          <p:cNvPr id="229" name="ML‹ … ›"/>
           <p:cNvSpPr/>
           <p:nvPr/>
         </p:nvSpPr>
@@ -5469,7 +8467,7 @@
       </p:sp>
       <p:sp>
         <p:nvSpPr>
-          <p:cNvPr id="167" name="datatype  . . …"/>
+          <p:cNvPr id="230" name="datatype  . . …"/>
           <p:cNvSpPr/>
           <p:nvPr/>
         </p:nvSpPr>
@@ -5520,7 +8518,7 @@
       </p:sp>
       <p:sp>
         <p:nvSpPr>
-          <p:cNvPr id="168" name="record . . ."/>
+          <p:cNvPr id="231" name="record . . ."/>
           <p:cNvSpPr/>
           <p:nvPr/>
         </p:nvSpPr>
@@ -5571,7 +8569,7 @@
       </p:sp>
       <p:sp>
         <p:nvSpPr>
-          <p:cNvPr id="169" name="Rectangle"/>
+          <p:cNvPr id="232" name="Rectangle"/>
           <p:cNvSpPr/>
           <p:nvPr/>
         </p:nvSpPr>
@@ -5615,7 +8613,7 @@
       </p:sp>
       <p:sp>
         <p:nvSpPr>
-          <p:cNvPr id="170" name="C"/>
+          <p:cNvPr id="233" name="C"/>
           <p:cNvSpPr txBox="1"/>
           <p:nvPr/>
         </p:nvSpPr>
@@ -5651,7 +8649,7 @@
       </p:sp>
       <p:sp>
         <p:nvSpPr>
-          <p:cNvPr id="171" name="header"/>
+          <p:cNvPr id="234" name="header"/>
           <p:cNvSpPr/>
           <p:nvPr/>
         </p:nvSpPr>
@@ -5702,7 +8700,7 @@
       </p:sp>
       <p:sp>
         <p:nvSpPr>
-          <p:cNvPr id="172" name="context…"/>
+          <p:cNvPr id="235" name="context…"/>
           <p:cNvSpPr/>
           <p:nvPr/>
         </p:nvSpPr>
@@ -5767,7 +8765,7 @@
       </p:sp>
       <p:sp>
         <p:nvSpPr>
-          <p:cNvPr id="173" name="term‹ … ›"/>
+          <p:cNvPr id="236" name="term‹ … ›"/>
           <p:cNvSpPr/>
           <p:nvPr/>
         </p:nvSpPr>
@@ -5818,7 +8816,7 @@
       </p:sp>
       <p:sp>
         <p:nvSpPr>
-          <p:cNvPr id="174" name="typ ‹ … ›"/>
+          <p:cNvPr id="237" name="typ ‹ … ›"/>
           <p:cNvSpPr/>
           <p:nvPr/>
         </p:nvSpPr>
@@ -5869,7 +8867,7 @@
       </p:sp>
       <p:sp>
         <p:nvSpPr>
-          <p:cNvPr id="175" name="theorem ‹…… ›"/>
+          <p:cNvPr id="238" name="theorem ‹…… ›"/>
           <p:cNvSpPr/>
           <p:nvPr/>
         </p:nvSpPr>
@@ -5923,7 +8921,7 @@
       </p:sp>
       <p:sp>
         <p:nvSpPr>
-          <p:cNvPr id="176" name="declare"/>
+          <p:cNvPr id="239" name="declare"/>
           <p:cNvSpPr/>
           <p:nvPr/>
         </p:nvSpPr>
@@ -5974,7 +8972,7 @@
       </p:sp>
       <p:sp>
         <p:nvSpPr>
-          <p:cNvPr id="177" name="Rectangle"/>
+          <p:cNvPr id="240" name="Rectangle"/>
           <p:cNvSpPr/>
           <p:nvPr/>
         </p:nvSpPr>
@@ -6018,7 +9016,7 @@
       </p:sp>
       <p:sp>
         <p:nvSpPr>
-          <p:cNvPr id="178" name="D"/>
+          <p:cNvPr id="241" name="D"/>
           <p:cNvSpPr txBox="1"/>
           <p:nvPr/>
         </p:nvSpPr>
@@ -6054,7 +9052,7 @@
       </p:sp>
       <p:sp>
         <p:nvSpPr>
-          <p:cNvPr id="179" name="header"/>
+          <p:cNvPr id="242" name="header"/>
           <p:cNvSpPr/>
           <p:nvPr/>
         </p:nvSpPr>
@@ -6105,7 +9103,7 @@
       </p:sp>
       <p:sp>
         <p:nvSpPr>
-          <p:cNvPr id="180" name="context…"/>
+          <p:cNvPr id="243" name="context…"/>
           <p:cNvSpPr/>
           <p:nvPr/>
         </p:nvSpPr>
@@ -6170,10 +9168,10 @@
       </p:sp>
       <p:cxnSp>
         <p:nvCxnSpPr>
-          <p:cNvPr id="181" name="Connection Line"/>
+          <p:cNvPr id="244" name="Connection Line"/>
           <p:cNvCxnSpPr>
-            <a:stCxn id="162" idx="0"/>
-            <a:endCxn id="165" idx="0"/>
+            <a:stCxn id="225" idx="0"/>
+            <a:endCxn id="228" idx="0"/>
           </p:cNvCxnSpPr>
           <p:nvPr/>
         </p:nvCxnSpPr>
@@ -6195,10 +9193,10 @@
       </p:cxnSp>
       <p:cxnSp>
         <p:nvCxnSpPr>
-          <p:cNvPr id="182" name="Connection Line"/>
+          <p:cNvPr id="245" name="Connection Line"/>
           <p:cNvCxnSpPr>
-            <a:stCxn id="165" idx="0"/>
-            <a:endCxn id="154" idx="0"/>
+            <a:stCxn id="228" idx="0"/>
+            <a:endCxn id="217" idx="0"/>
           </p:cNvCxnSpPr>
           <p:nvPr/>
         </p:nvCxnSpPr>
@@ -6221,10 +9219,10 @@
       </p:cxnSp>
       <p:cxnSp>
         <p:nvCxnSpPr>
-          <p:cNvPr id="183" name="Connection Line"/>
+          <p:cNvPr id="246" name="Connection Line"/>
           <p:cNvCxnSpPr>
-            <a:stCxn id="154" idx="0"/>
-            <a:endCxn id="172" idx="0"/>
+            <a:stCxn id="217" idx="0"/>
+            <a:endCxn id="235" idx="0"/>
           </p:cNvCxnSpPr>
           <p:nvPr/>
         </p:nvCxnSpPr>
@@ -6247,10 +9245,10 @@
       </p:cxnSp>
       <p:cxnSp>
         <p:nvCxnSpPr>
-          <p:cNvPr id="184" name="Connection Line"/>
+          <p:cNvPr id="247" name="Connection Line"/>
           <p:cNvCxnSpPr>
-            <a:stCxn id="162" idx="0"/>
-            <a:endCxn id="180" idx="0"/>
+            <a:stCxn id="225" idx="0"/>
+            <a:endCxn id="243" idx="0"/>
           </p:cNvCxnSpPr>
           <p:nvPr/>
         </p:nvCxnSpPr>
@@ -6273,10 +9271,10 @@
       </p:cxnSp>
       <p:cxnSp>
         <p:nvCxnSpPr>
-          <p:cNvPr id="185" name="Connection Line"/>
+          <p:cNvPr id="248" name="Connection Line"/>
           <p:cNvCxnSpPr>
-            <a:stCxn id="169" idx="0"/>
-            <a:endCxn id="180" idx="0"/>
+            <a:stCxn id="232" idx="0"/>
+            <a:endCxn id="243" idx="0"/>
           </p:cNvCxnSpPr>
           <p:nvPr/>
         </p:nvCxnSpPr>
@@ -6299,7 +9297,7 @@
       </p:cxnSp>
       <p:sp>
         <p:nvSpPr>
-          <p:cNvPr id="186" name="text‹ … ›"/>
+          <p:cNvPr id="249" name="text‹ … ›"/>
           <p:cNvSpPr/>
           <p:nvPr/>
         </p:nvSpPr>
@@ -6350,7 +9348,7 @@
       </p:sp>
       <p:sp>
         <p:nvSpPr>
-          <p:cNvPr id="187" name="definition‹ … ›"/>
+          <p:cNvPr id="250" name="definition‹ … ›"/>
           <p:cNvSpPr/>
           <p:nvPr/>
         </p:nvSpPr>
@@ -6404,7 +9402,7 @@
       </p:sp>
       <p:sp>
         <p:nvSpPr>
-          <p:cNvPr id="188" name="value‹ … ›"/>
+          <p:cNvPr id="251" name="value‹ … ›"/>
           <p:cNvSpPr/>
           <p:nvPr/>
         </p:nvSpPr>
@@ -6455,7 +9453,7 @@
       </p:sp>
       <p:sp>
         <p:nvSpPr>
-          <p:cNvPr id="189" name="lemma …"/>
+          <p:cNvPr id="252" name="lemma …"/>
           <p:cNvSpPr/>
           <p:nvPr/>
         </p:nvSpPr>
@@ -6504,6 +9502,46 @@
           </a:p>
         </p:txBody>
       </p:sp>
+      <p:sp>
+        <p:nvSpPr>
+          <p:cNvPr id="253" name="The Isabelle/Isar Document Model"/>
+          <p:cNvSpPr txBox="1"/>
+          <p:nvPr/>
+        </p:nvSpPr>
+        <p:spPr>
+          <a:xfrm>
+            <a:off x="-733646" y="439916"/>
+            <a:ext cx="6445692" cy="829360"/>
+          </a:xfrm>
+          <a:prstGeom prst="rect">
+            <a:avLst/>
+          </a:prstGeom>
+          <a:ln w="12700">
+            <a:miter lim="400000"/>
+          </a:ln>
+          <a:extLst>
+            <a:ext uri="{C572A759-6A51-4108-AA02-DFA0A04FC94B}">
+              <ma14:wrappingTextBoxFlag xmlns:ma14="http://schemas.microsoft.com/office/mac/drawingml/2011/main" val="1"/>
+            </a:ext>
+          </a:extLst>
+        </p:spPr>
+        <p:txBody>
+          <a:bodyPr lIns="50800" tIns="50800" rIns="50800" bIns="50800" anchor="ctr">
+            <a:spAutoFit/>
+          </a:bodyPr>
+          <a:lstStyle/>
+          <a:p>
+            <a:pPr/>
+            <a:r>
+              <a:t>The Isabelle/Isar</a:t>
+            </a:r>
+            <a:br/>
+            <a:r>
+              <a:t>Document Model</a:t>
+            </a:r>
+          </a:p>
+        </p:txBody>
+      </p:sp>
     </p:spTree>
   </p:cSld>
   <p:clrMapOvr>
@@ -6513,7 +9551,7 @@
 </p:sld>
 </file>
 
-<file path=ppt/slides/slide3.xml><?xml version="1.0" encoding="utf-8"?>
+<file path=ppt/slides/slide4.xml><?xml version="1.0" encoding="utf-8"?>
 <p:sld xmlns:a="http://schemas.openxmlformats.org/drawingml/2006/main" xmlns:r="http://schemas.openxmlformats.org/officeDocument/2006/relationships" xmlns:p="http://schemas.openxmlformats.org/presentationml/2006/main" xmlns:m="http://schemas.openxmlformats.org/officeDocument/2006/math" xmlns:a14="http://schemas.microsoft.com/office/drawing/2010/main" showMasterSp="1" showMasterPhAnim="1">
   <p:cSld>
     <p:spTree>
@@ -6532,7 +9570,7 @@
       </p:grpSpPr>
       <p:sp>
         <p:nvSpPr>
-          <p:cNvPr id="191" name="Rectangle"/>
+          <p:cNvPr id="255" name="Rectangle"/>
           <p:cNvSpPr/>
           <p:nvPr/>
         </p:nvSpPr>
@@ -6576,7 +9614,7 @@
       </p:sp>
       <p:sp>
         <p:nvSpPr>
-          <p:cNvPr id="192" name="HOL"/>
+          <p:cNvPr id="256" name="HOL"/>
           <p:cNvSpPr txBox="1"/>
           <p:nvPr/>
         </p:nvSpPr>
@@ -6612,7 +9650,7 @@
       </p:sp>
       <p:sp>
         <p:nvSpPr>
-          <p:cNvPr id="193" name="header"/>
+          <p:cNvPr id="257" name="header"/>
           <p:cNvSpPr/>
           <p:nvPr/>
         </p:nvSpPr>
@@ -6663,7 +9701,7 @@
       </p:sp>
       <p:sp>
         <p:nvSpPr>
-          <p:cNvPr id="194" name="context…"/>
+          <p:cNvPr id="258" name="context…"/>
           <p:cNvSpPr/>
           <p:nvPr/>
         </p:nvSpPr>
@@ -6728,7 +9766,7 @@
       </p:sp>
       <p:sp>
         <p:nvSpPr>
-          <p:cNvPr id="195" name="text‹ … ›"/>
+          <p:cNvPr id="259" name="text‹ … ›"/>
           <p:cNvSpPr/>
           <p:nvPr/>
         </p:nvSpPr>
@@ -6779,7 +9817,7 @@
       </p:sp>
       <p:sp>
         <p:nvSpPr>
-          <p:cNvPr id="196" name="definition‹ … ›"/>
+          <p:cNvPr id="260" name="definition‹ … ›"/>
           <p:cNvSpPr/>
           <p:nvPr/>
         </p:nvSpPr>
@@ -6833,7 +9871,7 @@
       </p:sp>
       <p:sp>
         <p:nvSpPr>
-          <p:cNvPr id="197" name="value‹ … ›"/>
+          <p:cNvPr id="261" name="value‹ … ›"/>
           <p:cNvSpPr/>
           <p:nvPr/>
         </p:nvSpPr>
@@ -6884,7 +9922,7 @@
       </p:sp>
       <p:sp>
         <p:nvSpPr>
-          <p:cNvPr id="198" name="lemma …"/>
+          <p:cNvPr id="262" name="lemma …"/>
           <p:cNvSpPr/>
           <p:nvPr/>
         </p:nvSpPr>
@@ -6935,7 +9973,7 @@
       </p:sp>
       <p:sp>
         <p:nvSpPr>
-          <p:cNvPr id="199" name="Rectangle"/>
+          <p:cNvPr id="263" name="Rectangle"/>
           <p:cNvSpPr/>
           <p:nvPr/>
         </p:nvSpPr>
@@ -6979,7 +10017,7 @@
       </p:sp>
       <p:sp>
         <p:nvSpPr>
-          <p:cNvPr id="200" name="Onto"/>
+          <p:cNvPr id="264" name="Onto"/>
           <p:cNvSpPr txBox="1"/>
           <p:nvPr/>
         </p:nvSpPr>
@@ -7015,7 +10053,7 @@
       </p:sp>
       <p:sp>
         <p:nvSpPr>
-          <p:cNvPr id="201" name="header"/>
+          <p:cNvPr id="265" name="header"/>
           <p:cNvSpPr/>
           <p:nvPr/>
         </p:nvSpPr>
@@ -7066,7 +10104,7 @@
       </p:sp>
       <p:sp>
         <p:nvSpPr>
-          <p:cNvPr id="202" name="context definition"/>
+          <p:cNvPr id="266" name="context definition"/>
           <p:cNvSpPr/>
           <p:nvPr/>
         </p:nvSpPr>
@@ -7275,7 +10313,7 @@
       </p:sp>
       <p:sp>
         <p:nvSpPr>
-          <p:cNvPr id="203" name="doc_class A ‹ … ›"/>
+          <p:cNvPr id="267" name="doc_class A ‹ … ›"/>
           <p:cNvSpPr/>
           <p:nvPr/>
         </p:nvSpPr>
@@ -7329,7 +10367,7 @@
       </p:sp>
       <p:sp>
         <p:nvSpPr>
-          <p:cNvPr id="204" name="datatype …"/>
+          <p:cNvPr id="268" name="datatype …"/>
           <p:cNvSpPr/>
           <p:nvPr/>
         </p:nvSpPr>
@@ -7383,7 +10421,7 @@
       </p:sp>
       <p:sp>
         <p:nvSpPr>
-          <p:cNvPr id="205" name="ML . . ."/>
+          <p:cNvPr id="269" name="ML . . ."/>
           <p:cNvSpPr/>
           <p:nvPr/>
         </p:nvSpPr>
@@ -7434,7 +10472,7 @@
       </p:sp>
       <p:sp>
         <p:nvSpPr>
-          <p:cNvPr id="206" name="Rectangle"/>
+          <p:cNvPr id="270" name="Rectangle"/>
           <p:cNvSpPr/>
           <p:nvPr/>
         </p:nvSpPr>
@@ -7478,7 +10516,7 @@
       </p:sp>
       <p:sp>
         <p:nvSpPr>
-          <p:cNvPr id="207" name="Doc1"/>
+          <p:cNvPr id="271" name="Doc1"/>
           <p:cNvSpPr txBox="1"/>
           <p:nvPr/>
         </p:nvSpPr>
@@ -7518,7 +10556,7 @@
       </p:sp>
       <p:sp>
         <p:nvSpPr>
-          <p:cNvPr id="208" name="header"/>
+          <p:cNvPr id="272" name="header"/>
           <p:cNvSpPr/>
           <p:nvPr/>
         </p:nvSpPr>
@@ -7569,7 +10607,7 @@
       </p:sp>
       <p:sp>
         <p:nvSpPr>
-          <p:cNvPr id="209" name="context…"/>
+          <p:cNvPr id="273" name="context…"/>
           <p:cNvSpPr/>
           <p:nvPr/>
         </p:nvSpPr>
@@ -7634,7 +10672,7 @@
       </p:sp>
       <p:sp>
         <p:nvSpPr>
-          <p:cNvPr id="210" name="term‹ … ›"/>
+          <p:cNvPr id="274" name="term‹ … ›"/>
           <p:cNvSpPr/>
           <p:nvPr/>
         </p:nvSpPr>
@@ -7685,7 +10723,7 @@
       </p:sp>
       <p:sp>
         <p:nvSpPr>
-          <p:cNvPr id="211" name="typ ‹ … ›"/>
+          <p:cNvPr id="275" name="typ ‹ … ›"/>
           <p:cNvSpPr/>
           <p:nvPr/>
         </p:nvSpPr>
@@ -7736,7 +10774,7 @@
       </p:sp>
       <p:sp>
         <p:nvSpPr>
-          <p:cNvPr id="212" name="theorem ‹…… ›"/>
+          <p:cNvPr id="276" name="theorem ‹…… ›"/>
           <p:cNvSpPr/>
           <p:nvPr/>
         </p:nvSpPr>
@@ -7790,7 +10828,7 @@
       </p:sp>
       <p:sp>
         <p:nvSpPr>
-          <p:cNvPr id="213" name="declare"/>
+          <p:cNvPr id="277" name="declare"/>
           <p:cNvSpPr/>
           <p:nvPr/>
         </p:nvSpPr>
@@ -7841,7 +10879,7 @@
       </p:sp>
       <p:sp>
         <p:nvSpPr>
-          <p:cNvPr id="214" name="Rectangle"/>
+          <p:cNvPr id="278" name="Rectangle"/>
           <p:cNvSpPr/>
           <p:nvPr/>
         </p:nvSpPr>
@@ -7885,7 +10923,7 @@
       </p:sp>
       <p:sp>
         <p:nvSpPr>
-          <p:cNvPr id="215" name="Doc2"/>
+          <p:cNvPr id="279" name="Doc2"/>
           <p:cNvSpPr txBox="1"/>
           <p:nvPr/>
         </p:nvSpPr>
@@ -7925,7 +10963,7 @@
       </p:sp>
       <p:sp>
         <p:nvSpPr>
-          <p:cNvPr id="216" name="header"/>
+          <p:cNvPr id="280" name="header"/>
           <p:cNvSpPr/>
           <p:nvPr/>
         </p:nvSpPr>
@@ -7976,7 +11014,7 @@
       </p:sp>
       <p:sp>
         <p:nvSpPr>
-          <p:cNvPr id="217" name="context…"/>
+          <p:cNvPr id="281" name="context…"/>
           <p:cNvSpPr/>
           <p:nvPr/>
         </p:nvSpPr>
@@ -8041,10 +11079,10 @@
       </p:sp>
       <p:cxnSp>
         <p:nvCxnSpPr>
-          <p:cNvPr id="218" name="Connection Line"/>
+          <p:cNvPr id="282" name="Connection Line"/>
           <p:cNvCxnSpPr>
-            <a:stCxn id="199" idx="0"/>
-            <a:endCxn id="202" idx="0"/>
+            <a:stCxn id="263" idx="0"/>
+            <a:endCxn id="266" idx="0"/>
           </p:cNvCxnSpPr>
           <p:nvPr/>
         </p:nvCxnSpPr>
@@ -8066,10 +11104,10 @@
       </p:cxnSp>
       <p:cxnSp>
         <p:nvCxnSpPr>
-          <p:cNvPr id="219" name="Connection Line"/>
+          <p:cNvPr id="283" name="Connection Line"/>
           <p:cNvCxnSpPr>
-            <a:stCxn id="202" idx="0"/>
-            <a:endCxn id="191" idx="0"/>
+            <a:stCxn id="266" idx="0"/>
+            <a:endCxn id="255" idx="0"/>
           </p:cNvCxnSpPr>
           <p:nvPr/>
         </p:nvCxnSpPr>
@@ -8092,10 +11130,10 @@
       </p:cxnSp>
       <p:cxnSp>
         <p:nvCxnSpPr>
-          <p:cNvPr id="220" name="Connection Line"/>
+          <p:cNvPr id="284" name="Connection Line"/>
           <p:cNvCxnSpPr>
-            <a:stCxn id="191" idx="0"/>
-            <a:endCxn id="209" idx="0"/>
+            <a:stCxn id="255" idx="0"/>
+            <a:endCxn id="273" idx="0"/>
           </p:cNvCxnSpPr>
           <p:nvPr/>
         </p:nvCxnSpPr>
@@ -8118,10 +11156,10 @@
       </p:cxnSp>
       <p:cxnSp>
         <p:nvCxnSpPr>
-          <p:cNvPr id="221" name="Connection Line"/>
+          <p:cNvPr id="285" name="Connection Line"/>
           <p:cNvCxnSpPr>
-            <a:stCxn id="199" idx="0"/>
-            <a:endCxn id="217" idx="0"/>
+            <a:stCxn id="263" idx="0"/>
+            <a:endCxn id="281" idx="0"/>
           </p:cNvCxnSpPr>
           <p:nvPr/>
         </p:nvCxnSpPr>
@@ -8144,10 +11182,10 @@
       </p:cxnSp>
       <p:cxnSp>
         <p:nvCxnSpPr>
-          <p:cNvPr id="222" name="Connection Line"/>
+          <p:cNvPr id="286" name="Connection Line"/>
           <p:cNvCxnSpPr>
-            <a:stCxn id="206" idx="0"/>
-            <a:endCxn id="217" idx="0"/>
+            <a:stCxn id="270" idx="0"/>
+            <a:endCxn id="281" idx="0"/>
           </p:cNvCxnSpPr>
           <p:nvPr/>
         </p:nvCxnSpPr>
@@ -8170,7 +11208,7 @@
       </p:cxnSp>
       <p:sp>
         <p:nvSpPr>
-          <p:cNvPr id="223" name="text*[a::A]‹  … ›"/>
+          <p:cNvPr id="287" name="text*[a::A]‹  … ›"/>
           <p:cNvSpPr/>
           <p:nvPr/>
         </p:nvSpPr>
@@ -8221,7 +11259,7 @@
       </p:sp>
       <p:sp>
         <p:nvSpPr>
-          <p:cNvPr id="224" name="definition*[b::B]‹ … ›"/>
+          <p:cNvPr id="288" name="definition*[b::B]‹ … ›"/>
           <p:cNvSpPr/>
           <p:nvPr/>
         </p:nvSpPr>
@@ -8275,7 +11313,7 @@
       </p:sp>
       <p:sp>
         <p:nvSpPr>
-          <p:cNvPr id="225" name="value*[c::A]‹ … ›"/>
+          <p:cNvPr id="289" name="value*[c::A]‹ … ›"/>
           <p:cNvSpPr/>
           <p:nvPr/>
         </p:nvSpPr>
@@ -8326,7 +11364,7 @@
       </p:sp>
       <p:sp>
         <p:nvSpPr>
-          <p:cNvPr id="226" name="lemma*[d::B] …"/>
+          <p:cNvPr id="290" name="lemma*[d::B] …"/>
           <p:cNvSpPr/>
           <p:nvPr/>
         </p:nvSpPr>
@@ -8377,7 +11415,7 @@
       </p:sp>
       <p:sp>
         <p:nvSpPr>
-          <p:cNvPr id="227" name="doc_class B ‹ … ›"/>
+          <p:cNvPr id="291" name="doc_class B ‹ … ›"/>
           <p:cNvSpPr/>
           <p:nvPr/>
         </p:nvSpPr>
@@ -8429,6 +11467,46 @@
           </a:p>
         </p:txBody>
       </p:sp>
+      <p:sp>
+        <p:nvSpPr>
+          <p:cNvPr id="292" name="The Isabelle_DOF Document Model"/>
+          <p:cNvSpPr txBox="1"/>
+          <p:nvPr/>
+        </p:nvSpPr>
+        <p:spPr>
+          <a:xfrm>
+            <a:off x="-733646" y="439916"/>
+            <a:ext cx="6445692" cy="829360"/>
+          </a:xfrm>
+          <a:prstGeom prst="rect">
+            <a:avLst/>
+          </a:prstGeom>
+          <a:ln w="12700">
+            <a:miter lim="400000"/>
+          </a:ln>
+          <a:extLst>
+            <a:ext uri="{C572A759-6A51-4108-AA02-DFA0A04FC94B}">
+              <ma14:wrappingTextBoxFlag xmlns:ma14="http://schemas.microsoft.com/office/mac/drawingml/2011/main" val="1"/>
+            </a:ext>
+          </a:extLst>
+        </p:spPr>
+        <p:txBody>
+          <a:bodyPr lIns="50800" tIns="50800" rIns="50800" bIns="50800" anchor="ctr">
+            <a:spAutoFit/>
+          </a:bodyPr>
+          <a:lstStyle/>
+          <a:p>
+            <a:pPr/>
+            <a:r>
+              <a:t>The Isabelle_DOF</a:t>
+            </a:r>
+            <a:br/>
+            <a:r>
+              <a:t>Document Model</a:t>
+            </a:r>
+          </a:p>
+        </p:txBody>
+      </p:sp>
     </p:spTree>
   </p:cSld>
   <p:clrMapOvr>
@@ -8438,7 +11516,7 @@
 </p:sld>
 </file>
 
-<file path=ppt/slides/slide4.xml><?xml version="1.0" encoding="utf-8"?>
+<file path=ppt/slides/slide5.xml><?xml version="1.0" encoding="utf-8"?>
 <p:sld xmlns:a="http://schemas.openxmlformats.org/drawingml/2006/main" xmlns:r="http://schemas.openxmlformats.org/officeDocument/2006/relationships" xmlns:p="http://schemas.openxmlformats.org/presentationml/2006/main" xmlns:m="http://schemas.openxmlformats.org/officeDocument/2006/math" xmlns:a14="http://schemas.microsoft.com/office/drawing/2010/main" showMasterSp="1" showMasterPhAnim="1">
   <p:cSld>
     <p:spTree>
@@ -8457,7 +11535,7 @@
       </p:grpSpPr>
       <p:sp>
         <p:nvSpPr>
-          <p:cNvPr id="229" name="Rectangle"/>
+          <p:cNvPr id="294" name="Rectangle"/>
           <p:cNvSpPr/>
           <p:nvPr/>
         </p:nvSpPr>
@@ -8501,7 +11579,7 @@
       </p:sp>
       <p:sp>
         <p:nvSpPr>
-          <p:cNvPr id="230" name="Onto"/>
+          <p:cNvPr id="295" name="Onto"/>
           <p:cNvSpPr txBox="1"/>
           <p:nvPr/>
         </p:nvSpPr>
@@ -8537,7 +11615,7 @@
       </p:sp>
       <p:sp>
         <p:nvSpPr>
-          <p:cNvPr id="231" name="header"/>
+          <p:cNvPr id="296" name="header"/>
           <p:cNvSpPr/>
           <p:nvPr/>
         </p:nvSpPr>
@@ -8588,7 +11666,7 @@
       </p:sp>
       <p:sp>
         <p:nvSpPr>
-          <p:cNvPr id="232" name="context definition"/>
+          <p:cNvPr id="297" name="context definition"/>
           <p:cNvSpPr/>
           <p:nvPr/>
         </p:nvSpPr>
@@ -8797,7 +11875,7 @@
       </p:sp>
       <p:sp>
         <p:nvSpPr>
-          <p:cNvPr id="233" name="doc_class A ‹ … ›"/>
+          <p:cNvPr id="298" name="doc_class A ‹ … ›"/>
           <p:cNvSpPr/>
           <p:nvPr/>
         </p:nvSpPr>
@@ -8854,7 +11932,7 @@
       </p:sp>
       <p:sp>
         <p:nvSpPr>
-          <p:cNvPr id="234" name="datatype …"/>
+          <p:cNvPr id="299" name="datatype …"/>
           <p:cNvSpPr/>
           <p:nvPr/>
         </p:nvSpPr>
@@ -8911,7 +11989,7 @@
       </p:sp>
       <p:sp>
         <p:nvSpPr>
-          <p:cNvPr id="235" name="ML . . ."/>
+          <p:cNvPr id="300" name="ML . . ."/>
           <p:cNvSpPr/>
           <p:nvPr/>
         </p:nvSpPr>
@@ -8965,7 +12043,7 @@
       </p:sp>
       <p:sp>
         <p:nvSpPr>
-          <p:cNvPr id="236" name="Rectangle"/>
+          <p:cNvPr id="301" name="Rectangle"/>
           <p:cNvSpPr/>
           <p:nvPr/>
         </p:nvSpPr>
@@ -9009,7 +12087,7 @@
       </p:sp>
       <p:sp>
         <p:nvSpPr>
-          <p:cNvPr id="237" name="Doc2"/>
+          <p:cNvPr id="302" name="Doc2"/>
           <p:cNvSpPr txBox="1"/>
           <p:nvPr/>
         </p:nvSpPr>
@@ -9049,7 +12127,7 @@
       </p:sp>
       <p:sp>
         <p:nvSpPr>
-          <p:cNvPr id="238" name="header"/>
+          <p:cNvPr id="303" name="header"/>
           <p:cNvSpPr/>
           <p:nvPr/>
         </p:nvSpPr>
@@ -9100,7 +12178,7 @@
       </p:sp>
       <p:sp>
         <p:nvSpPr>
-          <p:cNvPr id="239" name="context…"/>
+          <p:cNvPr id="304" name="context…"/>
           <p:cNvSpPr/>
           <p:nvPr/>
         </p:nvSpPr>
@@ -9165,10 +12243,10 @@
       </p:sp>
       <p:cxnSp>
         <p:nvCxnSpPr>
-          <p:cNvPr id="240" name="Connection Line"/>
+          <p:cNvPr id="305" name="Connection Line"/>
           <p:cNvCxnSpPr>
-            <a:stCxn id="229" idx="0"/>
-            <a:endCxn id="232" idx="0"/>
+            <a:stCxn id="294" idx="0"/>
+            <a:endCxn id="297" idx="0"/>
           </p:cNvCxnSpPr>
           <p:nvPr/>
         </p:nvCxnSpPr>
@@ -9190,7 +12268,7 @@
       </p:cxnSp>
       <p:sp>
         <p:nvSpPr>
-          <p:cNvPr id="258" name="Connection Line"/>
+          <p:cNvPr id="323" name="Connection Line"/>
           <p:cNvSpPr/>
           <p:nvPr/>
         </p:nvSpPr>
@@ -9250,10 +12328,10 @@
       </p:sp>
       <p:cxnSp>
         <p:nvCxnSpPr>
-          <p:cNvPr id="242" name="Connection Line"/>
+          <p:cNvPr id="307" name="Connection Line"/>
           <p:cNvCxnSpPr>
-            <a:stCxn id="229" idx="0"/>
-            <a:endCxn id="239" idx="0"/>
+            <a:stCxn id="294" idx="0"/>
+            <a:endCxn id="304" idx="0"/>
           </p:cNvCxnSpPr>
           <p:nvPr/>
         </p:nvCxnSpPr>
@@ -9276,7 +12354,7 @@
       </p:cxnSp>
       <p:sp>
         <p:nvSpPr>
-          <p:cNvPr id="259" name="Connection Line"/>
+          <p:cNvPr id="324" name="Connection Line"/>
           <p:cNvSpPr/>
           <p:nvPr/>
         </p:nvSpPr>
@@ -9336,7 +12414,7 @@
       </p:sp>
       <p:sp>
         <p:nvSpPr>
-          <p:cNvPr id="244" name="text*[a::A]‹  … ›"/>
+          <p:cNvPr id="309" name="text*[a::A]‹  … ›"/>
           <p:cNvSpPr/>
           <p:nvPr/>
         </p:nvSpPr>
@@ -9390,7 +12468,7 @@
       </p:sp>
       <p:sp>
         <p:nvSpPr>
-          <p:cNvPr id="245" name="definition*[b::B]‹ … ›"/>
+          <p:cNvPr id="310" name="definition*[b::B]‹ … ›"/>
           <p:cNvSpPr/>
           <p:nvPr/>
         </p:nvSpPr>
@@ -9447,7 +12525,7 @@
       </p:sp>
       <p:sp>
         <p:nvSpPr>
-          <p:cNvPr id="246" name="value*[c::A]‹ … ›"/>
+          <p:cNvPr id="311" name="value*[c::A]‹ … ›"/>
           <p:cNvSpPr/>
           <p:nvPr/>
         </p:nvSpPr>
@@ -9501,7 +12579,7 @@
       </p:sp>
       <p:sp>
         <p:nvSpPr>
-          <p:cNvPr id="247" name="lemma*[d::B] …"/>
+          <p:cNvPr id="312" name="lemma*[d::B] …"/>
           <p:cNvSpPr/>
           <p:nvPr/>
         </p:nvSpPr>
@@ -9555,7 +12633,7 @@
       </p:sp>
       <p:sp>
         <p:nvSpPr>
-          <p:cNvPr id="248" name="doc_class B ‹ … ›"/>
+          <p:cNvPr id="313" name="doc_class B ‹ … ›"/>
           <p:cNvSpPr/>
           <p:nvPr/>
         </p:nvSpPr>
@@ -9612,7 +12690,7 @@
       </p:sp>
       <p:sp>
         <p:nvSpPr>
-          <p:cNvPr id="249" name="Oval"/>
+          <p:cNvPr id="314" name="Oval"/>
           <p:cNvSpPr/>
           <p:nvPr/>
         </p:nvSpPr>
@@ -9655,7 +12733,7 @@
       </p:sp>
       <p:sp>
         <p:nvSpPr>
-          <p:cNvPr id="250" name="Oval"/>
+          <p:cNvPr id="315" name="Oval"/>
           <p:cNvSpPr/>
           <p:nvPr/>
         </p:nvSpPr>
@@ -9698,7 +12776,7 @@
       </p:sp>
       <p:sp>
         <p:nvSpPr>
-          <p:cNvPr id="251" name="Line"/>
+          <p:cNvPr id="316" name="Line"/>
           <p:cNvSpPr/>
           <p:nvPr/>
         </p:nvSpPr>
@@ -9774,7 +12852,7 @@
       </p:sp>
       <p:sp>
         <p:nvSpPr>
-          <p:cNvPr id="252" name="Oval"/>
+          <p:cNvPr id="317" name="Oval"/>
           <p:cNvSpPr/>
           <p:nvPr/>
         </p:nvSpPr>
@@ -9817,7 +12895,7 @@
       </p:sp>
       <p:sp>
         <p:nvSpPr>
-          <p:cNvPr id="253" name="Oval"/>
+          <p:cNvPr id="318" name="Oval"/>
           <p:cNvSpPr/>
           <p:nvPr/>
         </p:nvSpPr>
@@ -9860,7 +12938,7 @@
       </p:sp>
       <p:sp>
         <p:nvSpPr>
-          <p:cNvPr id="254" name="Line"/>
+          <p:cNvPr id="319" name="Line"/>
           <p:cNvSpPr/>
           <p:nvPr/>
         </p:nvSpPr>
@@ -9936,7 +13014,7 @@
       </p:sp>
       <p:sp>
         <p:nvSpPr>
-          <p:cNvPr id="255" name="Line"/>
+          <p:cNvPr id="320" name="Line"/>
           <p:cNvSpPr/>
           <p:nvPr/>
         </p:nvSpPr>
@@ -10012,7 +13090,7 @@
       </p:sp>
       <p:sp>
         <p:nvSpPr>
-          <p:cNvPr id="256" name="Oval"/>
+          <p:cNvPr id="321" name="Oval"/>
           <p:cNvSpPr/>
           <p:nvPr/>
         </p:nvSpPr>
@@ -10055,13 +13133,13 @@
       </p:sp>
       <p:sp>
         <p:nvSpPr>
-          <p:cNvPr id="257" name="Ontological Annotations and References"/>
+          <p:cNvPr id="322" name="Ontological Annotations  and References"/>
           <p:cNvSpPr txBox="1"/>
           <p:nvPr/>
         </p:nvSpPr>
         <p:spPr>
           <a:xfrm>
-            <a:off x="1015288" y="1109320"/>
+            <a:off x="469188" y="728320"/>
             <a:ext cx="5746575" cy="829360"/>
           </a:xfrm>
           <a:prstGeom prst="rect">
@@ -10084,7 +13162,11 @@
           <a:p>
             <a:pPr/>
             <a:r>
-              <a:t>Ontological Annotations and References</a:t>
+              <a:t>Ontological Annotations </a:t>
+            </a:r>
+            <a:br/>
+            <a:r>
+              <a:t>and References</a:t>
             </a:r>
           </a:p>
         </p:txBody>
@@ -10098,7 +13180,7 @@
 </p:sld>
 </file>
 
-<file path=ppt/slides/slide5.xml><?xml version="1.0" encoding="utf-8"?>
+<file path=ppt/slides/slide6.xml><?xml version="1.0" encoding="utf-8"?>
 <p:sld xmlns:a="http://schemas.openxmlformats.org/drawingml/2006/main" xmlns:r="http://schemas.openxmlformats.org/officeDocument/2006/relationships" xmlns:p="http://schemas.openxmlformats.org/presentationml/2006/main" xmlns:m="http://schemas.openxmlformats.org/officeDocument/2006/math" xmlns:a14="http://schemas.microsoft.com/office/drawing/2010/main" showMasterSp="1" showMasterPhAnim="1">
   <p:cSld>
     <p:spTree>
@@ -10117,7 +13199,7 @@
       </p:grpSpPr>
       <p:sp>
         <p:nvSpPr>
-          <p:cNvPr id="261" name="Rectangle"/>
+          <p:cNvPr id="326" name="Rectangle"/>
           <p:cNvSpPr/>
           <p:nvPr/>
         </p:nvSpPr>
@@ -10161,7 +13243,7 @@
       </p:sp>
       <p:sp>
         <p:nvSpPr>
-          <p:cNvPr id="262" name="Doc2"/>
+          <p:cNvPr id="327" name="Doc2"/>
           <p:cNvSpPr txBox="1"/>
           <p:nvPr/>
         </p:nvSpPr>
@@ -10203,7 +13285,7 @@
       </p:sp>
       <p:sp>
         <p:nvSpPr>
-          <p:cNvPr id="263" name="header"/>
+          <p:cNvPr id="328" name="header"/>
           <p:cNvSpPr/>
           <p:nvPr/>
         </p:nvSpPr>
@@ -10254,7 +13336,7 @@
       </p:sp>
       <p:sp>
         <p:nvSpPr>
-          <p:cNvPr id="264" name="context…"/>
+          <p:cNvPr id="329" name="context…"/>
           <p:cNvSpPr/>
           <p:nvPr/>
         </p:nvSpPr>
@@ -10319,7 +13401,7 @@
       </p:sp>
       <p:sp>
         <p:nvSpPr>
-          <p:cNvPr id="265" name="text*[a::A]‹  … ›"/>
+          <p:cNvPr id="330" name="text*[a::A]‹  … ›"/>
           <p:cNvSpPr/>
           <p:nvPr/>
         </p:nvSpPr>
@@ -10373,7 +13455,7 @@
       </p:sp>
       <p:sp>
         <p:nvSpPr>
-          <p:cNvPr id="266" name="definition*[b::B, tt=“@{A a}”]        ‹ … ›"/>
+          <p:cNvPr id="331" name="definition*[b::B, tt=“@{A a}”]        ‹ … ›"/>
           <p:cNvSpPr/>
           <p:nvPr/>
         </p:nvSpPr>
@@ -10438,7 +13520,7 @@
       </p:sp>
       <p:sp>
         <p:nvSpPr>
-          <p:cNvPr id="267" name="value*[c::A]‹ … @{A a} … ›"/>
+          <p:cNvPr id="332" name="value*[c::A]‹ … @{A a} … ›"/>
           <p:cNvSpPr/>
           <p:nvPr/>
         </p:nvSpPr>
@@ -10492,7 +13574,7 @@
       </p:sp>
       <p:sp>
         <p:nvSpPr>
-          <p:cNvPr id="268" name="lemma*[d::B]                     ‹ … @{A a} … ›"/>
+          <p:cNvPr id="333" name="lemma*[d::B]                     ‹ … @{A a} … ›"/>
           <p:cNvSpPr/>
           <p:nvPr/>
         </p:nvSpPr>
@@ -10548,7 +13630,7 @@
       </p:sp>
       <p:sp>
         <p:nvSpPr>
-          <p:cNvPr id="269" name="Line"/>
+          <p:cNvPr id="334" name="Line"/>
           <p:cNvSpPr/>
           <p:nvPr/>
         </p:nvSpPr>
@@ -10624,14 +13706,14 @@
       </p:sp>
       <p:sp>
         <p:nvSpPr>
-          <p:cNvPr id="270" name="Oval"/>
+          <p:cNvPr id="335" name="Oval"/>
           <p:cNvSpPr/>
           <p:nvPr/>
         </p:nvSpPr>
         <p:spPr>
           <a:xfrm>
-            <a:off x="6373673" y="5567660"/>
-            <a:ext cx="476969" cy="424181"/>
+            <a:off x="6154158" y="5567660"/>
+            <a:ext cx="696484" cy="424181"/>
           </a:xfrm>
           <a:prstGeom prst="ellipse">
             <a:avLst/>
@@ -10667,7 +13749,7 @@
       </p:sp>
       <p:sp>
         <p:nvSpPr>
-          <p:cNvPr id="271" name="Line"/>
+          <p:cNvPr id="336" name="Line"/>
           <p:cNvSpPr/>
           <p:nvPr/>
         </p:nvSpPr>
@@ -10743,7 +13825,7 @@
       </p:sp>
       <p:sp>
         <p:nvSpPr>
-          <p:cNvPr id="272" name="Line"/>
+          <p:cNvPr id="337" name="Line"/>
           <p:cNvSpPr/>
           <p:nvPr/>
         </p:nvSpPr>
@@ -10819,7 +13901,7 @@
       </p:sp>
       <p:sp>
         <p:nvSpPr>
-          <p:cNvPr id="273" name="Oval"/>
+          <p:cNvPr id="338" name="Oval"/>
           <p:cNvSpPr/>
           <p:nvPr/>
         </p:nvSpPr>
@@ -10862,13 +13944,13 @@
       </p:sp>
       <p:sp>
         <p:nvSpPr>
-          <p:cNvPr id="274" name="Oval"/>
+          <p:cNvPr id="339" name="Oval"/>
           <p:cNvSpPr/>
           <p:nvPr/>
         </p:nvSpPr>
         <p:spPr>
           <a:xfrm>
-            <a:off x="7256636" y="7153865"/>
+            <a:off x="7282036" y="7153865"/>
             <a:ext cx="883369" cy="505486"/>
           </a:xfrm>
           <a:prstGeom prst="ellipse">
@@ -10905,7 +13987,7 @@
       </p:sp>
       <p:sp>
         <p:nvSpPr>
-          <p:cNvPr id="275" name="Oval"/>
+          <p:cNvPr id="340" name="Oval"/>
           <p:cNvSpPr/>
           <p:nvPr/>
         </p:nvSpPr>
@@ -10948,13 +14030,13 @@
       </p:sp>
       <p:sp>
         <p:nvSpPr>
-          <p:cNvPr id="276" name="“Deep” Ontological Annotations for References embedded in Term-Contexts"/>
+          <p:cNvPr id="341" name="“Deep” Ontological Annotations for References embedded in Term-Contexts"/>
           <p:cNvSpPr txBox="1"/>
           <p:nvPr/>
         </p:nvSpPr>
         <p:spPr>
           <a:xfrm>
-            <a:off x="1015288" y="1109320"/>
+            <a:off x="558088" y="880720"/>
             <a:ext cx="6445693" cy="829360"/>
           </a:xfrm>
           <a:prstGeom prst="rect">

</xml_diff>